<commit_message>
KLeine wijzigingen aan de presentatie
</commit_message>
<xml_diff>
--- a/documentation/backendworkshop.pptx
+++ b/documentation/backendworkshop.pptx
@@ -26,34 +26,35 @@
     <p:sldId id="303" r:id="rId20"/>
     <p:sldId id="262" r:id="rId21"/>
     <p:sldId id="268" r:id="rId22"/>
-    <p:sldId id="271" r:id="rId23"/>
-    <p:sldId id="272" r:id="rId24"/>
-    <p:sldId id="273" r:id="rId25"/>
-    <p:sldId id="275" r:id="rId26"/>
-    <p:sldId id="274" r:id="rId27"/>
-    <p:sldId id="279" r:id="rId28"/>
-    <p:sldId id="280" r:id="rId29"/>
-    <p:sldId id="281" r:id="rId30"/>
-    <p:sldId id="282" r:id="rId31"/>
-    <p:sldId id="283" r:id="rId32"/>
-    <p:sldId id="284" r:id="rId33"/>
-    <p:sldId id="285" r:id="rId34"/>
-    <p:sldId id="286" r:id="rId35"/>
-    <p:sldId id="288" r:id="rId36"/>
-    <p:sldId id="289" r:id="rId37"/>
-    <p:sldId id="290" r:id="rId38"/>
-    <p:sldId id="291" r:id="rId39"/>
-    <p:sldId id="304" r:id="rId40"/>
-    <p:sldId id="293" r:id="rId41"/>
-    <p:sldId id="294" r:id="rId42"/>
-    <p:sldId id="295" r:id="rId43"/>
-    <p:sldId id="296" r:id="rId44"/>
-    <p:sldId id="306" r:id="rId45"/>
-    <p:sldId id="298" r:id="rId46"/>
-    <p:sldId id="300" r:id="rId47"/>
-    <p:sldId id="301" r:id="rId48"/>
-    <p:sldId id="302" r:id="rId49"/>
-    <p:sldId id="299" r:id="rId50"/>
+    <p:sldId id="307" r:id="rId23"/>
+    <p:sldId id="271" r:id="rId24"/>
+    <p:sldId id="272" r:id="rId25"/>
+    <p:sldId id="273" r:id="rId26"/>
+    <p:sldId id="275" r:id="rId27"/>
+    <p:sldId id="274" r:id="rId28"/>
+    <p:sldId id="279" r:id="rId29"/>
+    <p:sldId id="280" r:id="rId30"/>
+    <p:sldId id="281" r:id="rId31"/>
+    <p:sldId id="282" r:id="rId32"/>
+    <p:sldId id="283" r:id="rId33"/>
+    <p:sldId id="284" r:id="rId34"/>
+    <p:sldId id="285" r:id="rId35"/>
+    <p:sldId id="286" r:id="rId36"/>
+    <p:sldId id="288" r:id="rId37"/>
+    <p:sldId id="289" r:id="rId38"/>
+    <p:sldId id="290" r:id="rId39"/>
+    <p:sldId id="291" r:id="rId40"/>
+    <p:sldId id="304" r:id="rId41"/>
+    <p:sldId id="293" r:id="rId42"/>
+    <p:sldId id="294" r:id="rId43"/>
+    <p:sldId id="295" r:id="rId44"/>
+    <p:sldId id="296" r:id="rId45"/>
+    <p:sldId id="306" r:id="rId46"/>
+    <p:sldId id="298" r:id="rId47"/>
+    <p:sldId id="300" r:id="rId48"/>
+    <p:sldId id="301" r:id="rId49"/>
+    <p:sldId id="302" r:id="rId50"/>
+    <p:sldId id="299" r:id="rId51"/>
   </p:sldIdLst>
   <p:sldSz cx="12192000" cy="6858000"/>
   <p:notesSz cx="6858000" cy="9144000"/>
@@ -291,7 +292,7 @@
           <a:p>
             <a:fld id="{B8F827AF-F1B2-4FE1-8298-336C4F02AADF}" type="datetimeFigureOut">
               <a:rPr lang="nl-NL" smtClean="0"/>
-              <a:t>27-11-2020</a:t>
+              <a:t>2-7-2021</a:t>
             </a:fld>
             <a:endParaRPr lang="nl-NL"/>
           </a:p>
@@ -461,7 +462,7 @@
           <a:p>
             <a:fld id="{B8F827AF-F1B2-4FE1-8298-336C4F02AADF}" type="datetimeFigureOut">
               <a:rPr lang="nl-NL" smtClean="0"/>
-              <a:t>27-11-2020</a:t>
+              <a:t>2-7-2021</a:t>
             </a:fld>
             <a:endParaRPr lang="nl-NL"/>
           </a:p>
@@ -641,7 +642,7 @@
           <a:p>
             <a:fld id="{B8F827AF-F1B2-4FE1-8298-336C4F02AADF}" type="datetimeFigureOut">
               <a:rPr lang="nl-NL" smtClean="0"/>
-              <a:t>27-11-2020</a:t>
+              <a:t>2-7-2021</a:t>
             </a:fld>
             <a:endParaRPr lang="nl-NL"/>
           </a:p>
@@ -811,7 +812,7 @@
           <a:p>
             <a:fld id="{B8F827AF-F1B2-4FE1-8298-336C4F02AADF}" type="datetimeFigureOut">
               <a:rPr lang="nl-NL" smtClean="0"/>
-              <a:t>27-11-2020</a:t>
+              <a:t>2-7-2021</a:t>
             </a:fld>
             <a:endParaRPr lang="nl-NL"/>
           </a:p>
@@ -1057,7 +1058,7 @@
           <a:p>
             <a:fld id="{B8F827AF-F1B2-4FE1-8298-336C4F02AADF}" type="datetimeFigureOut">
               <a:rPr lang="nl-NL" smtClean="0"/>
-              <a:t>27-11-2020</a:t>
+              <a:t>2-7-2021</a:t>
             </a:fld>
             <a:endParaRPr lang="nl-NL"/>
           </a:p>
@@ -1289,7 +1290,7 @@
           <a:p>
             <a:fld id="{B8F827AF-F1B2-4FE1-8298-336C4F02AADF}" type="datetimeFigureOut">
               <a:rPr lang="nl-NL" smtClean="0"/>
-              <a:t>27-11-2020</a:t>
+              <a:t>2-7-2021</a:t>
             </a:fld>
             <a:endParaRPr lang="nl-NL"/>
           </a:p>
@@ -1656,7 +1657,7 @@
           <a:p>
             <a:fld id="{B8F827AF-F1B2-4FE1-8298-336C4F02AADF}" type="datetimeFigureOut">
               <a:rPr lang="nl-NL" smtClean="0"/>
-              <a:t>27-11-2020</a:t>
+              <a:t>2-7-2021</a:t>
             </a:fld>
             <a:endParaRPr lang="nl-NL"/>
           </a:p>
@@ -1774,7 +1775,7 @@
           <a:p>
             <a:fld id="{B8F827AF-F1B2-4FE1-8298-336C4F02AADF}" type="datetimeFigureOut">
               <a:rPr lang="nl-NL" smtClean="0"/>
-              <a:t>27-11-2020</a:t>
+              <a:t>2-7-2021</a:t>
             </a:fld>
             <a:endParaRPr lang="nl-NL"/>
           </a:p>
@@ -1869,7 +1870,7 @@
           <a:p>
             <a:fld id="{B8F827AF-F1B2-4FE1-8298-336C4F02AADF}" type="datetimeFigureOut">
               <a:rPr lang="nl-NL" smtClean="0"/>
-              <a:t>27-11-2020</a:t>
+              <a:t>2-7-2021</a:t>
             </a:fld>
             <a:endParaRPr lang="nl-NL"/>
           </a:p>
@@ -2146,7 +2147,7 @@
           <a:p>
             <a:fld id="{B8F827AF-F1B2-4FE1-8298-336C4F02AADF}" type="datetimeFigureOut">
               <a:rPr lang="nl-NL" smtClean="0"/>
-              <a:t>27-11-2020</a:t>
+              <a:t>2-7-2021</a:t>
             </a:fld>
             <a:endParaRPr lang="nl-NL"/>
           </a:p>
@@ -2403,7 +2404,7 @@
           <a:p>
             <a:fld id="{B8F827AF-F1B2-4FE1-8298-336C4F02AADF}" type="datetimeFigureOut">
               <a:rPr lang="nl-NL" smtClean="0"/>
-              <a:t>27-11-2020</a:t>
+              <a:t>2-7-2021</a:t>
             </a:fld>
             <a:endParaRPr lang="nl-NL"/>
           </a:p>
@@ -2616,7 +2617,7 @@
           <a:p>
             <a:fld id="{B8F827AF-F1B2-4FE1-8298-336C4F02AADF}" type="datetimeFigureOut">
               <a:rPr lang="nl-NL" smtClean="0"/>
-              <a:t>27-11-2020</a:t>
+              <a:t>2-7-2021</a:t>
             </a:fld>
             <a:endParaRPr lang="nl-NL"/>
           </a:p>
@@ -4793,8 +4794,8 @@
         </p:nvSpPr>
         <p:spPr bwMode="auto">
           <a:xfrm>
-            <a:off x="838200" y="4070514"/>
-            <a:ext cx="4595949" cy="2492990"/>
+            <a:off x="838200" y="4532179"/>
+            <a:ext cx="4595949" cy="1569660"/>
           </a:xfrm>
           <a:prstGeom prst="rect">
             <a:avLst/>
@@ -4850,65 +4851,81 @@
               </a:rPr>
             </a:br>
             <a:r>
-              <a:rPr kumimoji="0" lang="en-US" altLang="en-US" sz="1200" b="0" i="0" u="none" strike="noStrike" cap="none" normalizeH="0" baseline="0" dirty="0">
-                <a:ln>
-                  <a:noFill/>
-                </a:ln>
+              <a:rPr lang="en-US" altLang="en-US" sz="1200" dirty="0">
                 <a:solidFill>
                   <a:srgbClr val="CC7832"/>
                 </a:solidFill>
-                <a:effectLst/>
                 <a:latin typeface="Consolas" panose="020B0609020204030204" pitchFamily="49" charset="0"/>
               </a:rPr>
               <a:t>public class </a:t>
             </a:r>
             <a:r>
-              <a:rPr kumimoji="0" lang="en-US" altLang="en-US" sz="1200" b="0" i="0" u="none" strike="noStrike" cap="none" normalizeH="0" baseline="0" dirty="0" err="1">
-                <a:ln>
-                  <a:noFill/>
-                </a:ln>
+              <a:rPr lang="en-US" altLang="en-US" sz="1200" dirty="0" err="1">
                 <a:solidFill>
                   <a:srgbClr val="A9B7C6"/>
                 </a:solidFill>
-                <a:effectLst/>
                 <a:latin typeface="Consolas" panose="020B0609020204030204" pitchFamily="49" charset="0"/>
               </a:rPr>
-              <a:t>ConferencePanacheRepository</a:t>
-            </a:r>
-            <a:r>
-              <a:rPr kumimoji="0" lang="en-US" altLang="en-US" sz="1200" b="0" i="0" u="none" strike="noStrike" cap="none" normalizeH="0" baseline="0" dirty="0">
-                <a:ln>
-                  <a:noFill/>
-                </a:ln>
+              <a:t>ConferenceRepository</a:t>
+            </a:r>
+            <a:r>
+              <a:rPr lang="en-US" altLang="en-US" sz="1200" dirty="0">
                 <a:solidFill>
                   <a:srgbClr val="A9B7C6"/>
                 </a:solidFill>
-                <a:effectLst/>
                 <a:latin typeface="Consolas" panose="020B0609020204030204" pitchFamily="49" charset="0"/>
               </a:rPr>
-              <a:t> {</a:t>
+              <a:t> </a:t>
+            </a:r>
+            <a:r>
+              <a:rPr lang="en-US" altLang="en-US" sz="1200" dirty="0">
+                <a:solidFill>
+                  <a:srgbClr val="CC7832"/>
+                </a:solidFill>
+                <a:latin typeface="Consolas" panose="020B0609020204030204" pitchFamily="49" charset="0"/>
+              </a:rPr>
+              <a:t>implements</a:t>
+            </a:r>
+            <a:r>
+              <a:rPr lang="en-US" altLang="en-US" sz="1200" dirty="0">
+                <a:solidFill>
+                  <a:srgbClr val="A9B7C6"/>
+                </a:solidFill>
+                <a:latin typeface="Consolas" panose="020B0609020204030204" pitchFamily="49" charset="0"/>
+              </a:rPr>
+              <a:t> </a:t>
+            </a:r>
+            <a:r>
+              <a:rPr lang="en-US" altLang="en-US" sz="1200" dirty="0" err="1">
+                <a:solidFill>
+                  <a:srgbClr val="A9B7C6"/>
+                </a:solidFill>
+                <a:latin typeface="Consolas" panose="020B0609020204030204" pitchFamily="49" charset="0"/>
+              </a:rPr>
+              <a:t>PanacheRepository</a:t>
+            </a:r>
+            <a:r>
+              <a:rPr lang="en-US" altLang="en-US" sz="1200" dirty="0">
+                <a:solidFill>
+                  <a:srgbClr val="A9B7C6"/>
+                </a:solidFill>
+                <a:latin typeface="Consolas" panose="020B0609020204030204" pitchFamily="49" charset="0"/>
+              </a:rPr>
+              <a:t>&lt;Conference&gt; {</a:t>
             </a:r>
             <a:br>
-              <a:rPr kumimoji="0" lang="en-US" altLang="en-US" sz="1200" b="0" i="0" u="none" strike="noStrike" cap="none" normalizeH="0" baseline="0" dirty="0">
-                <a:ln>
-                  <a:noFill/>
-                </a:ln>
+              <a:rPr lang="en-US" altLang="en-US" sz="1200" dirty="0">
                 <a:solidFill>
                   <a:srgbClr val="A9B7C6"/>
                 </a:solidFill>
-                <a:effectLst/>
                 <a:latin typeface="Consolas" panose="020B0609020204030204" pitchFamily="49" charset="0"/>
               </a:rPr>
             </a:br>
             <a:br>
-              <a:rPr kumimoji="0" lang="en-US" altLang="en-US" sz="1200" b="0" i="0" u="none" strike="noStrike" cap="none" normalizeH="0" baseline="0" dirty="0">
-                <a:ln>
-                  <a:noFill/>
-                </a:ln>
+              <a:rPr lang="en-US" altLang="en-US" sz="1200" dirty="0">
                 <a:solidFill>
                   <a:srgbClr val="A9B7C6"/>
                 </a:solidFill>
-                <a:effectLst/>
                 <a:latin typeface="Consolas" panose="020B0609020204030204" pitchFamily="49" charset="0"/>
               </a:rPr>
             </a:br>
@@ -4937,7 +4954,7 @@
                 </a:solidFill>
                 <a:latin typeface="Consolas" panose="020B0609020204030204" pitchFamily="49" charset="0"/>
               </a:rPr>
-              <a:t>List&lt;Conference&gt; </a:t>
+              <a:t>Conference </a:t>
             </a:r>
             <a:r>
               <a:rPr lang="en-US" altLang="en-US" sz="1200" dirty="0" err="1">
@@ -4946,7 +4963,7 @@
                 </a:solidFill>
                 <a:latin typeface="Consolas" panose="020B0609020204030204" pitchFamily="49" charset="0"/>
               </a:rPr>
-              <a:t>findAll</a:t>
+              <a:t>findByName</a:t>
             </a:r>
             <a:r>
               <a:rPr lang="en-US" altLang="en-US" sz="1200" dirty="0">
@@ -4955,7 +4972,7 @@
                 </a:solidFill>
                 <a:latin typeface="Consolas" panose="020B0609020204030204" pitchFamily="49" charset="0"/>
               </a:rPr>
-              <a:t>() {</a:t>
+              <a:t>(String name) {</a:t>
             </a:r>
             <a:br>
               <a:rPr lang="en-US" altLang="en-US" sz="1200" dirty="0">
@@ -4984,22 +5001,31 @@
               <a:t>return </a:t>
             </a:r>
             <a:r>
+              <a:rPr lang="en-US" altLang="en-US" sz="1200" dirty="0">
+                <a:solidFill>
+                  <a:srgbClr val="A9B7C6"/>
+                </a:solidFill>
+                <a:latin typeface="Consolas" panose="020B0609020204030204" pitchFamily="49" charset="0"/>
+              </a:rPr>
+              <a:t>find(“name”, name)</a:t>
+            </a:r>
+            <a:r>
+              <a:rPr lang="en-US" altLang="en-US" sz="1200" i="1" dirty="0">
+                <a:solidFill>
+                  <a:srgbClr val="A9B7C6"/>
+                </a:solidFill>
+                <a:latin typeface="Consolas" panose="020B0609020204030204" pitchFamily="49" charset="0"/>
+              </a:rPr>
+              <a:t>.</a:t>
+            </a:r>
+            <a:r>
               <a:rPr lang="en-US" altLang="en-US" sz="1200" dirty="0" err="1">
                 <a:solidFill>
                   <a:srgbClr val="A9B7C6"/>
                 </a:solidFill>
                 <a:latin typeface="Consolas" panose="020B0609020204030204" pitchFamily="49" charset="0"/>
               </a:rPr>
-              <a:t>Conference.</a:t>
-            </a:r>
-            <a:r>
-              <a:rPr lang="en-US" altLang="en-US" sz="1200" i="1" dirty="0" err="1">
-                <a:solidFill>
-                  <a:srgbClr val="A9B7C6"/>
-                </a:solidFill>
-                <a:latin typeface="Consolas" panose="020B0609020204030204" pitchFamily="49" charset="0"/>
-              </a:rPr>
-              <a:t>listAll</a:t>
+              <a:t>firstResult</a:t>
             </a:r>
             <a:r>
               <a:rPr lang="en-US" altLang="en-US" sz="1200" dirty="0">
@@ -5053,308 +5079,11 @@
                 <a:latin typeface="Consolas" panose="020B0609020204030204" pitchFamily="49" charset="0"/>
               </a:rPr>
             </a:br>
-            <a:endParaRPr lang="en-US" altLang="en-US" sz="1200" dirty="0">
-              <a:solidFill>
-                <a:srgbClr val="A9B7C6"/>
-              </a:solidFill>
-              <a:latin typeface="Consolas" panose="020B0609020204030204" pitchFamily="49" charset="0"/>
-            </a:endParaRPr>
-          </a:p>
-          <a:p>
-            <a:pPr lvl="0" eaLnBrk="0" fontAlgn="base" hangingPunct="0">
-              <a:spcBef>
-                <a:spcPct val="0"/>
-              </a:spcBef>
-              <a:spcAft>
-                <a:spcPct val="0"/>
-              </a:spcAft>
-            </a:pPr>
             <a:r>
               <a:rPr lang="en-US" altLang="en-US" sz="1200" dirty="0">
                 <a:solidFill>
                   <a:srgbClr val="A9B7C6"/>
                 </a:solidFill>
-                <a:latin typeface="Consolas" panose="020B0609020204030204" pitchFamily="49" charset="0"/>
-              </a:rPr>
-              <a:t>    </a:t>
-            </a:r>
-            <a:r>
-              <a:rPr kumimoji="0" lang="en-US" altLang="en-US" sz="1200" b="0" i="0" u="none" strike="noStrike" cap="none" normalizeH="0" baseline="0" dirty="0">
-                <a:ln>
-                  <a:noFill/>
-                </a:ln>
-                <a:solidFill>
-                  <a:srgbClr val="BBB529"/>
-                </a:solidFill>
-                <a:effectLst/>
-                <a:latin typeface="Consolas" panose="020B0609020204030204" pitchFamily="49" charset="0"/>
-              </a:rPr>
-              <a:t>@Transactional</a:t>
-            </a:r>
-            <a:br>
-              <a:rPr kumimoji="0" lang="en-US" altLang="en-US" sz="1200" b="0" i="0" u="none" strike="noStrike" cap="none" normalizeH="0" baseline="0" dirty="0">
-                <a:ln>
-                  <a:noFill/>
-                </a:ln>
-                <a:solidFill>
-                  <a:srgbClr val="BBB529"/>
-                </a:solidFill>
-                <a:effectLst/>
-                <a:latin typeface="Consolas" panose="020B0609020204030204" pitchFamily="49" charset="0"/>
-              </a:rPr>
-            </a:br>
-            <a:r>
-              <a:rPr kumimoji="0" lang="en-US" altLang="en-US" sz="1200" b="0" i="0" u="none" strike="noStrike" cap="none" normalizeH="0" baseline="0" dirty="0">
-                <a:ln>
-                  <a:noFill/>
-                </a:ln>
-                <a:solidFill>
-                  <a:srgbClr val="BBB529"/>
-                </a:solidFill>
-                <a:effectLst/>
-                <a:latin typeface="Consolas" panose="020B0609020204030204" pitchFamily="49" charset="0"/>
-              </a:rPr>
-              <a:t>    </a:t>
-            </a:r>
-            <a:r>
-              <a:rPr kumimoji="0" lang="en-US" altLang="en-US" sz="1200" b="0" i="0" u="none" strike="noStrike" cap="none" normalizeH="0" baseline="0" dirty="0">
-                <a:ln>
-                  <a:noFill/>
-                </a:ln>
-                <a:solidFill>
-                  <a:srgbClr val="CC7832"/>
-                </a:solidFill>
-                <a:effectLst/>
-                <a:latin typeface="Consolas" panose="020B0609020204030204" pitchFamily="49" charset="0"/>
-              </a:rPr>
-              <a:t>public void </a:t>
-            </a:r>
-            <a:r>
-              <a:rPr kumimoji="0" lang="en-US" altLang="en-US" sz="1200" b="0" i="0" u="none" strike="noStrike" cap="none" normalizeH="0" baseline="0" dirty="0">
-                <a:ln>
-                  <a:noFill/>
-                </a:ln>
-                <a:solidFill>
-                  <a:srgbClr val="FFC66D"/>
-                </a:solidFill>
-                <a:effectLst/>
-                <a:latin typeface="Consolas" panose="020B0609020204030204" pitchFamily="49" charset="0"/>
-              </a:rPr>
-              <a:t>save</a:t>
-            </a:r>
-            <a:r>
-              <a:rPr kumimoji="0" lang="en-US" altLang="en-US" sz="1200" b="0" i="0" u="none" strike="noStrike" cap="none" normalizeH="0" baseline="0" dirty="0">
-                <a:ln>
-                  <a:noFill/>
-                </a:ln>
-                <a:solidFill>
-                  <a:srgbClr val="A9B7C6"/>
-                </a:solidFill>
-                <a:effectLst/>
-                <a:latin typeface="Consolas" panose="020B0609020204030204" pitchFamily="49" charset="0"/>
-              </a:rPr>
-              <a:t>(</a:t>
-            </a:r>
-            <a:r>
-              <a:rPr kumimoji="0" lang="en-US" altLang="en-US" sz="1200" b="0" i="0" u="none" strike="noStrike" cap="none" normalizeH="0" baseline="0" dirty="0">
-                <a:ln>
-                  <a:noFill/>
-                </a:ln>
-                <a:solidFill>
-                  <a:srgbClr val="CC7832"/>
-                </a:solidFill>
-                <a:effectLst/>
-                <a:latin typeface="Consolas" panose="020B0609020204030204" pitchFamily="49" charset="0"/>
-              </a:rPr>
-              <a:t>final </a:t>
-            </a:r>
-            <a:r>
-              <a:rPr kumimoji="0" lang="en-US" altLang="en-US" sz="1200" b="0" i="0" u="none" strike="noStrike" cap="none" normalizeH="0" baseline="0" dirty="0">
-                <a:ln>
-                  <a:noFill/>
-                </a:ln>
-                <a:solidFill>
-                  <a:srgbClr val="A9B7C6"/>
-                </a:solidFill>
-                <a:effectLst/>
-                <a:latin typeface="Consolas" panose="020B0609020204030204" pitchFamily="49" charset="0"/>
-              </a:rPr>
-              <a:t>Conference </a:t>
-            </a:r>
-            <a:r>
-              <a:rPr kumimoji="0" lang="en-US" altLang="en-US" sz="1200" b="0" i="1" u="none" strike="noStrike" cap="none" normalizeH="0" baseline="0" dirty="0">
-                <a:ln>
-                  <a:noFill/>
-                </a:ln>
-                <a:solidFill>
-                  <a:srgbClr val="9876AA"/>
-                </a:solidFill>
-                <a:effectLst/>
-                <a:latin typeface="Consolas" panose="020B0609020204030204" pitchFamily="49" charset="0"/>
-              </a:rPr>
-              <a:t>conference</a:t>
-            </a:r>
-            <a:r>
-              <a:rPr kumimoji="0" lang="en-US" altLang="en-US" sz="1200" b="0" i="0" u="none" strike="noStrike" cap="none" normalizeH="0" baseline="0" dirty="0">
-                <a:ln>
-                  <a:noFill/>
-                </a:ln>
-                <a:solidFill>
-                  <a:srgbClr val="A9B7C6"/>
-                </a:solidFill>
-                <a:effectLst/>
-                <a:latin typeface="Consolas" panose="020B0609020204030204" pitchFamily="49" charset="0"/>
-              </a:rPr>
-              <a:t>) {</a:t>
-            </a:r>
-            <a:br>
-              <a:rPr kumimoji="0" lang="en-US" altLang="en-US" sz="1200" b="0" i="0" u="none" strike="noStrike" cap="none" normalizeH="0" baseline="0" dirty="0">
-                <a:ln>
-                  <a:noFill/>
-                </a:ln>
-                <a:solidFill>
-                  <a:srgbClr val="A9B7C6"/>
-                </a:solidFill>
-                <a:effectLst/>
-                <a:latin typeface="Consolas" panose="020B0609020204030204" pitchFamily="49" charset="0"/>
-              </a:rPr>
-            </a:br>
-            <a:r>
-              <a:rPr kumimoji="0" lang="en-US" altLang="en-US" sz="1200" b="0" i="0" u="none" strike="noStrike" cap="none" normalizeH="0" baseline="0" dirty="0">
-                <a:ln>
-                  <a:noFill/>
-                </a:ln>
-                <a:solidFill>
-                  <a:srgbClr val="A9B7C6"/>
-                </a:solidFill>
-                <a:effectLst/>
-                <a:latin typeface="Consolas" panose="020B0609020204030204" pitchFamily="49" charset="0"/>
-              </a:rPr>
-              <a:t>        </a:t>
-            </a:r>
-            <a:r>
-              <a:rPr kumimoji="0" lang="en-US" altLang="en-US" sz="1200" b="0" i="1" u="none" strike="noStrike" cap="none" normalizeH="0" baseline="0" dirty="0" err="1">
-                <a:ln>
-                  <a:noFill/>
-                </a:ln>
-                <a:solidFill>
-                  <a:srgbClr val="9876AA"/>
-                </a:solidFill>
-                <a:effectLst/>
-                <a:latin typeface="Consolas" panose="020B0609020204030204" pitchFamily="49" charset="0"/>
-              </a:rPr>
-              <a:t>conference</a:t>
-            </a:r>
-            <a:r>
-              <a:rPr kumimoji="0" lang="en-US" altLang="en-US" sz="1200" b="0" i="0" u="none" strike="noStrike" cap="none" normalizeH="0" baseline="0" dirty="0" err="1">
-                <a:ln>
-                  <a:noFill/>
-                </a:ln>
-                <a:solidFill>
-                  <a:srgbClr val="A9B7C6"/>
-                </a:solidFill>
-                <a:effectLst/>
-                <a:latin typeface="Consolas" panose="020B0609020204030204" pitchFamily="49" charset="0"/>
-              </a:rPr>
-              <a:t>.persist</a:t>
-            </a:r>
-            <a:r>
-              <a:rPr kumimoji="0" lang="en-US" altLang="en-US" sz="1200" b="0" i="0" u="none" strike="noStrike" cap="none" normalizeH="0" baseline="0" dirty="0">
-                <a:ln>
-                  <a:noFill/>
-                </a:ln>
-                <a:solidFill>
-                  <a:srgbClr val="A9B7C6"/>
-                </a:solidFill>
-                <a:effectLst/>
-                <a:latin typeface="Consolas" panose="020B0609020204030204" pitchFamily="49" charset="0"/>
-              </a:rPr>
-              <a:t>()</a:t>
-            </a:r>
-            <a:r>
-              <a:rPr kumimoji="0" lang="en-US" altLang="en-US" sz="1200" b="0" i="0" u="none" strike="noStrike" cap="none" normalizeH="0" baseline="0" dirty="0">
-                <a:ln>
-                  <a:noFill/>
-                </a:ln>
-                <a:solidFill>
-                  <a:srgbClr val="CC7832"/>
-                </a:solidFill>
-                <a:effectLst/>
-                <a:latin typeface="Consolas" panose="020B0609020204030204" pitchFamily="49" charset="0"/>
-              </a:rPr>
-              <a:t>;</a:t>
-            </a:r>
-            <a:br>
-              <a:rPr kumimoji="0" lang="en-US" altLang="en-US" sz="1200" b="0" i="0" u="none" strike="noStrike" cap="none" normalizeH="0" baseline="0" dirty="0">
-                <a:ln>
-                  <a:noFill/>
-                </a:ln>
-                <a:solidFill>
-                  <a:srgbClr val="CC7832"/>
-                </a:solidFill>
-                <a:effectLst/>
-                <a:latin typeface="Consolas" panose="020B0609020204030204" pitchFamily="49" charset="0"/>
-              </a:rPr>
-            </a:br>
-            <a:r>
-              <a:rPr kumimoji="0" lang="en-US" altLang="en-US" sz="1200" b="0" i="0" u="none" strike="noStrike" cap="none" normalizeH="0" baseline="0" dirty="0">
-                <a:ln>
-                  <a:noFill/>
-                </a:ln>
-                <a:solidFill>
-                  <a:srgbClr val="CC7832"/>
-                </a:solidFill>
-                <a:effectLst/>
-                <a:latin typeface="Consolas" panose="020B0609020204030204" pitchFamily="49" charset="0"/>
-              </a:rPr>
-              <a:t>    </a:t>
-            </a:r>
-            <a:r>
-              <a:rPr kumimoji="0" lang="en-US" altLang="en-US" sz="1200" b="0" i="0" u="none" strike="noStrike" cap="none" normalizeH="0" baseline="0" dirty="0">
-                <a:ln>
-                  <a:noFill/>
-                </a:ln>
-                <a:solidFill>
-                  <a:srgbClr val="A9B7C6"/>
-                </a:solidFill>
-                <a:effectLst/>
-                <a:latin typeface="Consolas" panose="020B0609020204030204" pitchFamily="49" charset="0"/>
-              </a:rPr>
-              <a:t>}</a:t>
-            </a:r>
-            <a:br>
-              <a:rPr kumimoji="0" lang="en-US" altLang="en-US" sz="1200" b="0" i="0" u="none" strike="noStrike" cap="none" normalizeH="0" baseline="0" dirty="0">
-                <a:ln>
-                  <a:noFill/>
-                </a:ln>
-                <a:solidFill>
-                  <a:srgbClr val="A9B7C6"/>
-                </a:solidFill>
-                <a:effectLst/>
-                <a:latin typeface="Consolas" panose="020B0609020204030204" pitchFamily="49" charset="0"/>
-              </a:rPr>
-            </a:br>
-            <a:br>
-              <a:rPr kumimoji="0" lang="en-US" altLang="en-US" sz="1200" b="0" i="0" u="none" strike="noStrike" cap="none" normalizeH="0" baseline="0" dirty="0">
-                <a:ln>
-                  <a:noFill/>
-                </a:ln>
-                <a:solidFill>
-                  <a:srgbClr val="A9B7C6"/>
-                </a:solidFill>
-                <a:effectLst/>
-                <a:latin typeface="Consolas" panose="020B0609020204030204" pitchFamily="49" charset="0"/>
-              </a:rPr>
-            </a:br>
-            <a:r>
-              <a:rPr kumimoji="0" lang="en-US" altLang="en-US" sz="1200" b="0" i="0" u="none" strike="noStrike" cap="none" normalizeH="0" baseline="0" dirty="0">
-                <a:ln>
-                  <a:noFill/>
-                </a:ln>
-                <a:solidFill>
-                  <a:srgbClr val="A9B7C6"/>
-                </a:solidFill>
-                <a:effectLst/>
                 <a:latin typeface="Consolas" panose="020B0609020204030204" pitchFamily="49" charset="0"/>
               </a:rPr>
               <a:t>}</a:t>
@@ -7255,7 +6984,13 @@
       </p:grpSpPr>
       <p:sp>
         <p:nvSpPr>
-          <p:cNvPr id="2" name="Title 1"/>
+          <p:cNvPr id="4" name="Titel 3">
+            <a:extLst>
+              <a:ext uri="{FF2B5EF4-FFF2-40B4-BE49-F238E27FC236}">
+                <a16:creationId xmlns:a16="http://schemas.microsoft.com/office/drawing/2014/main" id="{19C28E81-6E1C-4881-A53C-1CAF7E5E4D03}"/>
+              </a:ext>
+            </a:extLst>
+          </p:cNvPr>
           <p:cNvSpPr>
             <a:spLocks noGrp="1"/>
           </p:cNvSpPr>
@@ -7265,7 +7000,7 @@
         </p:nvSpPr>
         <p:spPr>
           <a:xfrm>
-            <a:off x="310978" y="85038"/>
+            <a:off x="695587" y="123553"/>
             <a:ext cx="10515600" cy="1325563"/>
           </a:xfrm>
         </p:spPr>
@@ -7275,24 +7010,21 @@
           <a:p>
             <a:pPr algn="ctr"/>
             <a:r>
-              <a:rPr lang="nl-NL" dirty="0" err="1"/>
-              <a:t>Fault</a:t>
-            </a:r>
-            <a:r>
               <a:rPr lang="nl-NL" dirty="0"/>
-              <a:t> </a:t>
-            </a:r>
-            <a:r>
-              <a:rPr lang="nl-NL" dirty="0" err="1"/>
-              <a:t>Tolerance</a:t>
-            </a:r>
-            <a:endParaRPr lang="en-US" dirty="0"/>
+              <a:t>REST Client</a:t>
+            </a:r>
           </a:p>
         </p:txBody>
       </p:sp>
       <p:pic>
         <p:nvPicPr>
-          <p:cNvPr id="4" name="Picture 3"/>
+          <p:cNvPr id="3" name="Afbeelding 2">
+            <a:extLst>
+              <a:ext uri="{FF2B5EF4-FFF2-40B4-BE49-F238E27FC236}">
+                <a16:creationId xmlns:a16="http://schemas.microsoft.com/office/drawing/2014/main" id="{B7524910-25F0-438B-9065-82CCC1D59C46}"/>
+              </a:ext>
+            </a:extLst>
+          </p:cNvPr>
           <p:cNvPicPr>
             <a:picLocks noChangeAspect="1"/>
           </p:cNvPicPr>
@@ -7306,48 +7038,18 @@
         </p:blipFill>
         <p:spPr>
           <a:xfrm>
-            <a:off x="2067826" y="2215591"/>
-            <a:ext cx="7836220" cy="3674463"/>
+            <a:off x="2197450" y="1314443"/>
+            <a:ext cx="7797099" cy="4709561"/>
           </a:xfrm>
           <a:prstGeom prst="rect">
             <a:avLst/>
           </a:prstGeom>
         </p:spPr>
       </p:pic>
-      <p:sp>
-        <p:nvSpPr>
-          <p:cNvPr id="5" name="TextBox 4"/>
-          <p:cNvSpPr txBox="1"/>
-          <p:nvPr/>
-        </p:nvSpPr>
-        <p:spPr>
-          <a:xfrm>
-            <a:off x="4885038" y="1235675"/>
-            <a:ext cx="1178143" cy="646331"/>
-          </a:xfrm>
-          <a:prstGeom prst="rect">
-            <a:avLst/>
-          </a:prstGeom>
-          <a:noFill/>
-        </p:spPr>
-        <p:txBody>
-          <a:bodyPr wrap="none" rtlCol="0">
-            <a:spAutoFit/>
-          </a:bodyPr>
-          <a:lstStyle/>
-          <a:p>
-            <a:r>
-              <a:rPr lang="nl-NL" sz="3600" dirty="0" err="1"/>
-              <a:t>Retry</a:t>
-            </a:r>
-            <a:endParaRPr lang="en-US" sz="3600" dirty="0"/>
-          </a:p>
-        </p:txBody>
-      </p:sp>
     </p:spTree>
     <p:extLst>
       <p:ext uri="{BB962C8B-B14F-4D97-AF65-F5344CB8AC3E}">
-        <p14:creationId xmlns:p14="http://schemas.microsoft.com/office/powerpoint/2010/main" val="3454142040"/>
+        <p14:creationId xmlns:p14="http://schemas.microsoft.com/office/powerpoint/2010/main" val="3391653370"/>
       </p:ext>
     </p:extLst>
   </p:cSld>
@@ -7411,39 +7113,9 @@
           </a:p>
         </p:txBody>
       </p:sp>
-      <p:sp>
-        <p:nvSpPr>
-          <p:cNvPr id="5" name="TextBox 4"/>
-          <p:cNvSpPr txBox="1"/>
-          <p:nvPr/>
-        </p:nvSpPr>
-        <p:spPr>
-          <a:xfrm>
-            <a:off x="4885038" y="1235675"/>
-            <a:ext cx="1752403" cy="646331"/>
-          </a:xfrm>
-          <a:prstGeom prst="rect">
-            <a:avLst/>
-          </a:prstGeom>
-          <a:noFill/>
-        </p:spPr>
-        <p:txBody>
-          <a:bodyPr wrap="none" rtlCol="0">
-            <a:spAutoFit/>
-          </a:bodyPr>
-          <a:lstStyle/>
-          <a:p>
-            <a:r>
-              <a:rPr lang="nl-NL" sz="3600" dirty="0" err="1"/>
-              <a:t>Timeout</a:t>
-            </a:r>
-            <a:endParaRPr lang="en-US" sz="3600" dirty="0"/>
-          </a:p>
-        </p:txBody>
-      </p:sp>
       <p:pic>
         <p:nvPicPr>
-          <p:cNvPr id="3" name="Picture 2"/>
+          <p:cNvPr id="4" name="Picture 3"/>
           <p:cNvPicPr>
             <a:picLocks noChangeAspect="1"/>
           </p:cNvPicPr>
@@ -7457,18 +7129,48 @@
         </p:blipFill>
         <p:spPr>
           <a:xfrm>
-            <a:off x="2174789" y="2060362"/>
-            <a:ext cx="9045146" cy="4273463"/>
+            <a:off x="2067826" y="2215591"/>
+            <a:ext cx="7836220" cy="3674463"/>
           </a:xfrm>
           <a:prstGeom prst="rect">
             <a:avLst/>
           </a:prstGeom>
         </p:spPr>
       </p:pic>
+      <p:sp>
+        <p:nvSpPr>
+          <p:cNvPr id="5" name="TextBox 4"/>
+          <p:cNvSpPr txBox="1"/>
+          <p:nvPr/>
+        </p:nvSpPr>
+        <p:spPr>
+          <a:xfrm>
+            <a:off x="4885038" y="1235675"/>
+            <a:ext cx="1178143" cy="646331"/>
+          </a:xfrm>
+          <a:prstGeom prst="rect">
+            <a:avLst/>
+          </a:prstGeom>
+          <a:noFill/>
+        </p:spPr>
+        <p:txBody>
+          <a:bodyPr wrap="none" rtlCol="0">
+            <a:spAutoFit/>
+          </a:bodyPr>
+          <a:lstStyle/>
+          <a:p>
+            <a:r>
+              <a:rPr lang="nl-NL" sz="3600" dirty="0" err="1"/>
+              <a:t>Retry</a:t>
+            </a:r>
+            <a:endParaRPr lang="en-US" sz="3600" dirty="0"/>
+          </a:p>
+        </p:txBody>
+      </p:sp>
     </p:spTree>
     <p:extLst>
       <p:ext uri="{BB962C8B-B14F-4D97-AF65-F5344CB8AC3E}">
-        <p14:creationId xmlns:p14="http://schemas.microsoft.com/office/powerpoint/2010/main" val="2503060255"/>
+        <p14:creationId xmlns:p14="http://schemas.microsoft.com/office/powerpoint/2010/main" val="3454142040"/>
       </p:ext>
     </p:extLst>
   </p:cSld>
@@ -7541,6 +7243,127 @@
         <p:spPr>
           <a:xfrm>
             <a:off x="4885038" y="1235675"/>
+            <a:ext cx="1752403" cy="646331"/>
+          </a:xfrm>
+          <a:prstGeom prst="rect">
+            <a:avLst/>
+          </a:prstGeom>
+          <a:noFill/>
+        </p:spPr>
+        <p:txBody>
+          <a:bodyPr wrap="none" rtlCol="0">
+            <a:spAutoFit/>
+          </a:bodyPr>
+          <a:lstStyle/>
+          <a:p>
+            <a:r>
+              <a:rPr lang="nl-NL" sz="3600" dirty="0" err="1"/>
+              <a:t>Timeout</a:t>
+            </a:r>
+            <a:endParaRPr lang="en-US" sz="3600" dirty="0"/>
+          </a:p>
+        </p:txBody>
+      </p:sp>
+      <p:pic>
+        <p:nvPicPr>
+          <p:cNvPr id="3" name="Picture 2"/>
+          <p:cNvPicPr>
+            <a:picLocks noChangeAspect="1"/>
+          </p:cNvPicPr>
+          <p:nvPr/>
+        </p:nvPicPr>
+        <p:blipFill>
+          <a:blip r:embed="rId2"/>
+          <a:stretch>
+            <a:fillRect/>
+          </a:stretch>
+        </p:blipFill>
+        <p:spPr>
+          <a:xfrm>
+            <a:off x="2174789" y="2060362"/>
+            <a:ext cx="9045146" cy="4273463"/>
+          </a:xfrm>
+          <a:prstGeom prst="rect">
+            <a:avLst/>
+          </a:prstGeom>
+        </p:spPr>
+      </p:pic>
+    </p:spTree>
+    <p:extLst>
+      <p:ext uri="{BB962C8B-B14F-4D97-AF65-F5344CB8AC3E}">
+        <p14:creationId xmlns:p14="http://schemas.microsoft.com/office/powerpoint/2010/main" val="2503060255"/>
+      </p:ext>
+    </p:extLst>
+  </p:cSld>
+  <p:clrMapOvr>
+    <a:masterClrMapping/>
+  </p:clrMapOvr>
+</p:sld>
+</file>
+
+<file path=ppt/slides/slide25.xml><?xml version="1.0" encoding="utf-8"?>
+<p:sld xmlns:a="http://schemas.openxmlformats.org/drawingml/2006/main" xmlns:r="http://schemas.openxmlformats.org/officeDocument/2006/relationships" xmlns:p="http://schemas.openxmlformats.org/presentationml/2006/main">
+  <p:cSld>
+    <p:spTree>
+      <p:nvGrpSpPr>
+        <p:cNvPr id="1" name=""/>
+        <p:cNvGrpSpPr/>
+        <p:nvPr/>
+      </p:nvGrpSpPr>
+      <p:grpSpPr>
+        <a:xfrm>
+          <a:off x="0" y="0"/>
+          <a:ext cx="0" cy="0"/>
+          <a:chOff x="0" y="0"/>
+          <a:chExt cx="0" cy="0"/>
+        </a:xfrm>
+      </p:grpSpPr>
+      <p:sp>
+        <p:nvSpPr>
+          <p:cNvPr id="2" name="Title 1"/>
+          <p:cNvSpPr>
+            <a:spLocks noGrp="1"/>
+          </p:cNvSpPr>
+          <p:nvPr>
+            <p:ph type="title"/>
+          </p:nvPr>
+        </p:nvSpPr>
+        <p:spPr>
+          <a:xfrm>
+            <a:off x="310978" y="85038"/>
+            <a:ext cx="10515600" cy="1325563"/>
+          </a:xfrm>
+        </p:spPr>
+        <p:txBody>
+          <a:bodyPr/>
+          <a:lstStyle/>
+          <a:p>
+            <a:pPr algn="ctr"/>
+            <a:r>
+              <a:rPr lang="nl-NL" dirty="0" err="1"/>
+              <a:t>Fault</a:t>
+            </a:r>
+            <a:r>
+              <a:rPr lang="nl-NL" dirty="0"/>
+              <a:t> </a:t>
+            </a:r>
+            <a:r>
+              <a:rPr lang="nl-NL" dirty="0" err="1"/>
+              <a:t>Tolerance</a:t>
+            </a:r>
+            <a:endParaRPr lang="en-US" dirty="0"/>
+          </a:p>
+        </p:txBody>
+      </p:sp>
+      <p:sp>
+        <p:nvSpPr>
+          <p:cNvPr id="5" name="TextBox 4"/>
+          <p:cNvSpPr txBox="1"/>
+          <p:nvPr/>
+        </p:nvSpPr>
+        <p:spPr>
+          <a:xfrm>
+            <a:off x="4885038" y="1235675"/>
             <a:ext cx="1685526" cy="646331"/>
           </a:xfrm>
           <a:prstGeom prst="rect">
@@ -7599,7 +7422,7 @@
 </p:sld>
 </file>
 
-<file path=ppt/slides/slide25.xml><?xml version="1.0" encoding="utf-8"?>
+<file path=ppt/slides/slide26.xml><?xml version="1.0" encoding="utf-8"?>
 <p:sld xmlns:a="http://schemas.openxmlformats.org/drawingml/2006/main" xmlns:r="http://schemas.openxmlformats.org/officeDocument/2006/relationships" xmlns:p="http://schemas.openxmlformats.org/presentationml/2006/main">
   <p:cSld>
     <p:spTree>
@@ -7741,131 +7564,6 @@
 </p:sld>
 </file>
 
-<file path=ppt/slides/slide26.xml><?xml version="1.0" encoding="utf-8"?>
-<p:sld xmlns:a="http://schemas.openxmlformats.org/drawingml/2006/main" xmlns:r="http://schemas.openxmlformats.org/officeDocument/2006/relationships" xmlns:p="http://schemas.openxmlformats.org/presentationml/2006/main">
-  <p:cSld>
-    <p:spTree>
-      <p:nvGrpSpPr>
-        <p:cNvPr id="1" name=""/>
-        <p:cNvGrpSpPr/>
-        <p:nvPr/>
-      </p:nvGrpSpPr>
-      <p:grpSpPr>
-        <a:xfrm>
-          <a:off x="0" y="0"/>
-          <a:ext cx="0" cy="0"/>
-          <a:chOff x="0" y="0"/>
-          <a:chExt cx="0" cy="0"/>
-        </a:xfrm>
-      </p:grpSpPr>
-      <p:sp>
-        <p:nvSpPr>
-          <p:cNvPr id="2" name="Title 1"/>
-          <p:cNvSpPr>
-            <a:spLocks noGrp="1"/>
-          </p:cNvSpPr>
-          <p:nvPr>
-            <p:ph type="title"/>
-          </p:nvPr>
-        </p:nvSpPr>
-        <p:spPr>
-          <a:xfrm>
-            <a:off x="360405" y="83747"/>
-            <a:ext cx="10515600" cy="883379"/>
-          </a:xfrm>
-        </p:spPr>
-        <p:txBody>
-          <a:bodyPr/>
-          <a:lstStyle/>
-          <a:p>
-            <a:pPr algn="ctr"/>
-            <a:r>
-              <a:rPr lang="nl-NL" dirty="0" err="1"/>
-              <a:t>Fault</a:t>
-            </a:r>
-            <a:r>
-              <a:rPr lang="nl-NL" dirty="0"/>
-              <a:t> </a:t>
-            </a:r>
-            <a:r>
-              <a:rPr lang="nl-NL" dirty="0" err="1"/>
-              <a:t>Tolerance</a:t>
-            </a:r>
-            <a:endParaRPr lang="en-US" dirty="0"/>
-          </a:p>
-        </p:txBody>
-      </p:sp>
-      <p:sp>
-        <p:nvSpPr>
-          <p:cNvPr id="5" name="TextBox 4"/>
-          <p:cNvSpPr txBox="1"/>
-          <p:nvPr/>
-        </p:nvSpPr>
-        <p:spPr>
-          <a:xfrm>
-            <a:off x="4275438" y="745388"/>
-            <a:ext cx="2923749" cy="646331"/>
-          </a:xfrm>
-          <a:prstGeom prst="rect">
-            <a:avLst/>
-          </a:prstGeom>
-          <a:noFill/>
-        </p:spPr>
-        <p:txBody>
-          <a:bodyPr wrap="none" rtlCol="0">
-            <a:spAutoFit/>
-          </a:bodyPr>
-          <a:lstStyle/>
-          <a:p>
-            <a:r>
-              <a:rPr lang="nl-NL" sz="3600" dirty="0"/>
-              <a:t>Circuit </a:t>
-            </a:r>
-            <a:r>
-              <a:rPr lang="nl-NL" sz="3600" dirty="0" err="1"/>
-              <a:t>breaker</a:t>
-            </a:r>
-            <a:endParaRPr lang="en-US" sz="3600" dirty="0"/>
-          </a:p>
-        </p:txBody>
-      </p:sp>
-      <p:pic>
-        <p:nvPicPr>
-          <p:cNvPr id="4" name="Picture 3"/>
-          <p:cNvPicPr>
-            <a:picLocks noChangeAspect="1"/>
-          </p:cNvPicPr>
-          <p:nvPr/>
-        </p:nvPicPr>
-        <p:blipFill>
-          <a:blip r:embed="rId2"/>
-          <a:stretch>
-            <a:fillRect/>
-          </a:stretch>
-        </p:blipFill>
-        <p:spPr>
-          <a:xfrm>
-            <a:off x="1641003" y="1501474"/>
-            <a:ext cx="9058275" cy="5057775"/>
-          </a:xfrm>
-          <a:prstGeom prst="rect">
-            <a:avLst/>
-          </a:prstGeom>
-        </p:spPr>
-      </p:pic>
-    </p:spTree>
-    <p:extLst>
-      <p:ext uri="{BB962C8B-B14F-4D97-AF65-F5344CB8AC3E}">
-        <p14:creationId xmlns:p14="http://schemas.microsoft.com/office/powerpoint/2010/main" val="3523460402"/>
-      </p:ext>
-    </p:extLst>
-  </p:cSld>
-  <p:clrMapOvr>
-    <a:masterClrMapping/>
-  </p:clrMapOvr>
-</p:sld>
-</file>
-
 <file path=ppt/slides/slide27.xml><?xml version="1.0" encoding="utf-8"?>
 <p:sld xmlns:a="http://schemas.openxmlformats.org/drawingml/2006/main" xmlns:r="http://schemas.openxmlformats.org/officeDocument/2006/relationships" xmlns:p="http://schemas.openxmlformats.org/presentationml/2006/main">
   <p:cSld>
@@ -7885,60 +7583,6 @@
       </p:grpSpPr>
       <p:sp>
         <p:nvSpPr>
-          <p:cNvPr id="5" name="Rectangle 4">
-            <a:extLst>
-              <a:ext uri="{FF2B5EF4-FFF2-40B4-BE49-F238E27FC236}">
-                <a16:creationId xmlns:a16="http://schemas.microsoft.com/office/drawing/2014/main" id="{2C7AD1DE-9B66-4E3B-A49F-B43A3C9C4CFC}"/>
-              </a:ext>
-            </a:extLst>
-          </p:cNvPr>
-          <p:cNvSpPr/>
-          <p:nvPr/>
-        </p:nvSpPr>
-        <p:spPr>
-          <a:xfrm>
-            <a:off x="659094" y="1534932"/>
-            <a:ext cx="10338419" cy="3498387"/>
-          </a:xfrm>
-          <a:prstGeom prst="rect">
-            <a:avLst/>
-          </a:prstGeom>
-          <a:solidFill>
-            <a:schemeClr val="tx1"/>
-          </a:solidFill>
-          <a:ln>
-            <a:solidFill>
-              <a:schemeClr val="tx1"/>
-            </a:solidFill>
-          </a:ln>
-        </p:spPr>
-        <p:style>
-          <a:lnRef idx="2">
-            <a:schemeClr val="accent1">
-              <a:shade val="50000"/>
-            </a:schemeClr>
-          </a:lnRef>
-          <a:fillRef idx="1">
-            <a:schemeClr val="accent1"/>
-          </a:fillRef>
-          <a:effectRef idx="0">
-            <a:schemeClr val="accent1"/>
-          </a:effectRef>
-          <a:fontRef idx="minor">
-            <a:schemeClr val="lt1"/>
-          </a:fontRef>
-        </p:style>
-        <p:txBody>
-          <a:bodyPr rtlCol="0" anchor="ctr"/>
-          <a:lstStyle/>
-          <a:p>
-            <a:pPr algn="ctr"/>
-            <a:endParaRPr lang="nl-NL"/>
-          </a:p>
-        </p:txBody>
-      </p:sp>
-      <p:sp>
-        <p:nvSpPr>
           <p:cNvPr id="2" name="Title 1"/>
           <p:cNvSpPr>
             <a:spLocks noGrp="1"/>
@@ -7947,7 +7591,12 @@
             <p:ph type="title"/>
           </p:nvPr>
         </p:nvSpPr>
-        <p:spPr/>
+        <p:spPr>
+          <a:xfrm>
+            <a:off x="360405" y="83747"/>
+            <a:ext cx="10515600" cy="883379"/>
+          </a:xfrm>
+        </p:spPr>
         <p:txBody>
           <a:bodyPr/>
           <a:lstStyle/>
@@ -7955,61 +7604,82 @@
             <a:pPr algn="ctr"/>
             <a:r>
               <a:rPr lang="nl-NL" dirty="0" err="1"/>
-              <a:t>Reactive</a:t>
+              <a:t>Fault</a:t>
             </a:r>
             <a:r>
               <a:rPr lang="nl-NL" dirty="0"/>
-              <a:t> Messaging</a:t>
+              <a:t> </a:t>
+            </a:r>
+            <a:r>
+              <a:rPr lang="nl-NL" dirty="0" err="1"/>
+              <a:t>Tolerance</a:t>
             </a:r>
             <a:endParaRPr lang="en-US" dirty="0"/>
+          </a:p>
+        </p:txBody>
+      </p:sp>
+      <p:sp>
+        <p:nvSpPr>
+          <p:cNvPr id="5" name="TextBox 4"/>
+          <p:cNvSpPr txBox="1"/>
+          <p:nvPr/>
+        </p:nvSpPr>
+        <p:spPr>
+          <a:xfrm>
+            <a:off x="4275438" y="745388"/>
+            <a:ext cx="2923749" cy="646331"/>
+          </a:xfrm>
+          <a:prstGeom prst="rect">
+            <a:avLst/>
+          </a:prstGeom>
+          <a:noFill/>
+        </p:spPr>
+        <p:txBody>
+          <a:bodyPr wrap="none" rtlCol="0">
+            <a:spAutoFit/>
+          </a:bodyPr>
+          <a:lstStyle/>
+          <a:p>
+            <a:r>
+              <a:rPr lang="nl-NL" sz="3600" dirty="0"/>
+              <a:t>Circuit </a:t>
+            </a:r>
+            <a:r>
+              <a:rPr lang="nl-NL" sz="3600" dirty="0" err="1"/>
+              <a:t>breaker</a:t>
+            </a:r>
+            <a:endParaRPr lang="en-US" sz="3600" dirty="0"/>
           </a:p>
         </p:txBody>
       </p:sp>
       <p:pic>
         <p:nvPicPr>
-          <p:cNvPr id="4098" name="Picture 2" descr="Architecture"/>
+          <p:cNvPr id="4" name="Picture 3"/>
           <p:cNvPicPr>
-            <a:picLocks noChangeAspect="1" noChangeArrowheads="1"/>
+            <a:picLocks noChangeAspect="1"/>
           </p:cNvPicPr>
           <p:nvPr/>
         </p:nvPicPr>
         <p:blipFill>
-          <a:blip r:embed="rId2">
-            <a:extLst>
-              <a:ext uri="{28A0092B-C50C-407E-A947-70E740481C1C}">
-                <a14:useLocalDpi xmlns:a14="http://schemas.microsoft.com/office/drawing/2010/main" val="0"/>
-              </a:ext>
-            </a:extLst>
-          </a:blip>
-          <a:srcRect/>
+          <a:blip r:embed="rId2"/>
           <a:stretch>
             <a:fillRect/>
           </a:stretch>
         </p:blipFill>
-        <p:spPr bwMode="auto">
-          <a:xfrm>
-            <a:off x="1069975" y="1828499"/>
-            <a:ext cx="9001125" cy="2533651"/>
+        <p:spPr>
+          <a:xfrm>
+            <a:off x="1641003" y="1501474"/>
+            <a:ext cx="9058275" cy="5057775"/>
           </a:xfrm>
           <a:prstGeom prst="rect">
             <a:avLst/>
           </a:prstGeom>
-          <a:noFill/>
-          <a:extLst>
-            <a:ext uri="{909E8E84-426E-40DD-AFC4-6F175D3DCCD1}">
-              <a14:hiddenFill xmlns:a14="http://schemas.microsoft.com/office/drawing/2010/main">
-                <a:solidFill>
-                  <a:srgbClr val="FFFFFF"/>
-                </a:solidFill>
-              </a14:hiddenFill>
-            </a:ext>
-          </a:extLst>
         </p:spPr>
       </p:pic>
     </p:spTree>
     <p:extLst>
       <p:ext uri="{BB962C8B-B14F-4D97-AF65-F5344CB8AC3E}">
-        <p14:creationId xmlns:p14="http://schemas.microsoft.com/office/powerpoint/2010/main" val="3427516082"/>
+        <p14:creationId xmlns:p14="http://schemas.microsoft.com/office/powerpoint/2010/main" val="3523460402"/>
       </p:ext>
     </p:extLst>
   </p:cSld>
@@ -8038,6 +7708,60 @@
       </p:grpSpPr>
       <p:sp>
         <p:nvSpPr>
+          <p:cNvPr id="5" name="Rectangle 4">
+            <a:extLst>
+              <a:ext uri="{FF2B5EF4-FFF2-40B4-BE49-F238E27FC236}">
+                <a16:creationId xmlns:a16="http://schemas.microsoft.com/office/drawing/2014/main" id="{2C7AD1DE-9B66-4E3B-A49F-B43A3C9C4CFC}"/>
+              </a:ext>
+            </a:extLst>
+          </p:cNvPr>
+          <p:cNvSpPr/>
+          <p:nvPr/>
+        </p:nvSpPr>
+        <p:spPr>
+          <a:xfrm>
+            <a:off x="659094" y="1534932"/>
+            <a:ext cx="10338419" cy="3498387"/>
+          </a:xfrm>
+          <a:prstGeom prst="rect">
+            <a:avLst/>
+          </a:prstGeom>
+          <a:solidFill>
+            <a:schemeClr val="tx1"/>
+          </a:solidFill>
+          <a:ln>
+            <a:solidFill>
+              <a:schemeClr val="tx1"/>
+            </a:solidFill>
+          </a:ln>
+        </p:spPr>
+        <p:style>
+          <a:lnRef idx="2">
+            <a:schemeClr val="accent1">
+              <a:shade val="50000"/>
+            </a:schemeClr>
+          </a:lnRef>
+          <a:fillRef idx="1">
+            <a:schemeClr val="accent1"/>
+          </a:fillRef>
+          <a:effectRef idx="0">
+            <a:schemeClr val="accent1"/>
+          </a:effectRef>
+          <a:fontRef idx="minor">
+            <a:schemeClr val="lt1"/>
+          </a:fontRef>
+        </p:style>
+        <p:txBody>
+          <a:bodyPr rtlCol="0" anchor="ctr"/>
+          <a:lstStyle/>
+          <a:p>
+            <a:pPr algn="ctr"/>
+            <a:endParaRPr lang="nl-NL"/>
+          </a:p>
+        </p:txBody>
+      </p:sp>
+      <p:sp>
+        <p:nvSpPr>
           <p:cNvPr id="2" name="Title 1"/>
           <p:cNvSpPr>
             <a:spLocks noGrp="1"/>
@@ -8046,12 +7770,7 @@
             <p:ph type="title"/>
           </p:nvPr>
         </p:nvSpPr>
-        <p:spPr>
-          <a:xfrm>
-            <a:off x="838200" y="365125"/>
-            <a:ext cx="10950146" cy="1325563"/>
-          </a:xfrm>
-        </p:spPr>
+        <p:spPr/>
         <p:txBody>
           <a:bodyPr/>
           <a:lstStyle/>
@@ -8063,11 +7782,7 @@
             </a:r>
             <a:r>
               <a:rPr lang="nl-NL" dirty="0"/>
-              <a:t> Messaging - </a:t>
-            </a:r>
-            <a:r>
-              <a:rPr lang="nl-NL" dirty="0" err="1"/>
-              <a:t>Outgoing</a:t>
+              <a:t> Messaging</a:t>
             </a:r>
             <a:endParaRPr lang="en-US" dirty="0"/>
           </a:p>
@@ -8075,32 +7790,49 @@
       </p:sp>
       <p:pic>
         <p:nvPicPr>
-          <p:cNvPr id="3" name="Picture 2"/>
+          <p:cNvPr id="4098" name="Picture 2" descr="Architecture"/>
           <p:cNvPicPr>
-            <a:picLocks noChangeAspect="1"/>
+            <a:picLocks noChangeAspect="1" noChangeArrowheads="1"/>
           </p:cNvPicPr>
           <p:nvPr/>
         </p:nvPicPr>
         <p:blipFill>
-          <a:blip r:embed="rId2"/>
+          <a:blip r:embed="rId2">
+            <a:extLst>
+              <a:ext uri="{28A0092B-C50C-407E-A947-70E740481C1C}">
+                <a14:useLocalDpi xmlns:a14="http://schemas.microsoft.com/office/drawing/2010/main" val="0"/>
+              </a:ext>
+            </a:extLst>
+          </a:blip>
+          <a:srcRect/>
           <a:stretch>
             <a:fillRect/>
           </a:stretch>
         </p:blipFill>
-        <p:spPr>
-          <a:xfrm>
-            <a:off x="911374" y="1477725"/>
-            <a:ext cx="10369251" cy="4789080"/>
+        <p:spPr bwMode="auto">
+          <a:xfrm>
+            <a:off x="1069975" y="1828499"/>
+            <a:ext cx="9001125" cy="2533651"/>
           </a:xfrm>
           <a:prstGeom prst="rect">
             <a:avLst/>
           </a:prstGeom>
+          <a:noFill/>
+          <a:extLst>
+            <a:ext uri="{909E8E84-426E-40DD-AFC4-6F175D3DCCD1}">
+              <a14:hiddenFill xmlns:a14="http://schemas.microsoft.com/office/drawing/2010/main">
+                <a:solidFill>
+                  <a:srgbClr val="FFFFFF"/>
+                </a:solidFill>
+              </a14:hiddenFill>
+            </a:ext>
+          </a:extLst>
         </p:spPr>
       </p:pic>
     </p:spTree>
     <p:extLst>
       <p:ext uri="{BB962C8B-B14F-4D97-AF65-F5344CB8AC3E}">
-        <p14:creationId xmlns:p14="http://schemas.microsoft.com/office/powerpoint/2010/main" val="2843082269"/>
+        <p14:creationId xmlns:p14="http://schemas.microsoft.com/office/powerpoint/2010/main" val="3427516082"/>
       </p:ext>
     </p:extLst>
   </p:cSld>
@@ -8154,11 +7886,11 @@
             </a:r>
             <a:r>
               <a:rPr lang="nl-NL" dirty="0"/>
-              <a:t> Messaging – </a:t>
+              <a:t> Messaging - </a:t>
             </a:r>
             <a:r>
               <a:rPr lang="nl-NL" dirty="0" err="1"/>
-              <a:t>Incoming</a:t>
+              <a:t>Outgoing</a:t>
             </a:r>
             <a:endParaRPr lang="en-US" dirty="0"/>
           </a:p>
@@ -8166,7 +7898,7 @@
       </p:sp>
       <p:pic>
         <p:nvPicPr>
-          <p:cNvPr id="4" name="Picture 3"/>
+          <p:cNvPr id="3" name="Picture 2"/>
           <p:cNvPicPr>
             <a:picLocks noChangeAspect="1"/>
           </p:cNvPicPr>
@@ -8180,8 +7912,8 @@
         </p:blipFill>
         <p:spPr>
           <a:xfrm>
-            <a:off x="2098729" y="1405333"/>
-            <a:ext cx="7689636" cy="5087542"/>
+            <a:off x="911374" y="1477725"/>
+            <a:ext cx="10369251" cy="4789080"/>
           </a:xfrm>
           <a:prstGeom prst="rect">
             <a:avLst/>
@@ -8191,7 +7923,7 @@
     </p:spTree>
     <p:extLst>
       <p:ext uri="{BB962C8B-B14F-4D97-AF65-F5344CB8AC3E}">
-        <p14:creationId xmlns:p14="http://schemas.microsoft.com/office/powerpoint/2010/main" val="2706061197"/>
+        <p14:creationId xmlns:p14="http://schemas.microsoft.com/office/powerpoint/2010/main" val="2843082269"/>
       </p:ext>
     </p:extLst>
   </p:cSld>
@@ -8409,7 +8141,11 @@
             </a:r>
             <a:r>
               <a:rPr lang="nl-NL" dirty="0"/>
-              <a:t> Messaging – Publisher</a:t>
+              <a:t> Messaging – </a:t>
+            </a:r>
+            <a:r>
+              <a:rPr lang="nl-NL" dirty="0" err="1"/>
+              <a:t>Incoming</a:t>
             </a:r>
             <a:endParaRPr lang="en-US" dirty="0"/>
           </a:p>
@@ -8417,7 +8153,7 @@
       </p:sp>
       <p:pic>
         <p:nvPicPr>
-          <p:cNvPr id="3" name="Picture 2"/>
+          <p:cNvPr id="4" name="Picture 3"/>
           <p:cNvPicPr>
             <a:picLocks noChangeAspect="1"/>
           </p:cNvPicPr>
@@ -8431,8 +8167,8 @@
         </p:blipFill>
         <p:spPr>
           <a:xfrm>
-            <a:off x="1996260" y="1575358"/>
-            <a:ext cx="7839718" cy="4632017"/>
+            <a:off x="2098729" y="1405333"/>
+            <a:ext cx="7689636" cy="5087542"/>
           </a:xfrm>
           <a:prstGeom prst="rect">
             <a:avLst/>
@@ -8442,7 +8178,7 @@
     </p:spTree>
     <p:extLst>
       <p:ext uri="{BB962C8B-B14F-4D97-AF65-F5344CB8AC3E}">
-        <p14:creationId xmlns:p14="http://schemas.microsoft.com/office/powerpoint/2010/main" val="3927654935"/>
+        <p14:creationId xmlns:p14="http://schemas.microsoft.com/office/powerpoint/2010/main" val="2706061197"/>
       </p:ext>
     </p:extLst>
   </p:cSld>
@@ -8479,6 +8215,93 @@
             <p:ph type="title"/>
           </p:nvPr>
         </p:nvSpPr>
+        <p:spPr>
+          <a:xfrm>
+            <a:off x="838200" y="365125"/>
+            <a:ext cx="10950146" cy="1325563"/>
+          </a:xfrm>
+        </p:spPr>
+        <p:txBody>
+          <a:bodyPr/>
+          <a:lstStyle/>
+          <a:p>
+            <a:pPr algn="ctr"/>
+            <a:r>
+              <a:rPr lang="nl-NL" dirty="0" err="1"/>
+              <a:t>Reactive</a:t>
+            </a:r>
+            <a:r>
+              <a:rPr lang="nl-NL" dirty="0"/>
+              <a:t> Messaging – Publisher</a:t>
+            </a:r>
+            <a:endParaRPr lang="en-US" dirty="0"/>
+          </a:p>
+        </p:txBody>
+      </p:sp>
+      <p:pic>
+        <p:nvPicPr>
+          <p:cNvPr id="3" name="Picture 2"/>
+          <p:cNvPicPr>
+            <a:picLocks noChangeAspect="1"/>
+          </p:cNvPicPr>
+          <p:nvPr/>
+        </p:nvPicPr>
+        <p:blipFill>
+          <a:blip r:embed="rId2"/>
+          <a:stretch>
+            <a:fillRect/>
+          </a:stretch>
+        </p:blipFill>
+        <p:spPr>
+          <a:xfrm>
+            <a:off x="1996260" y="1575358"/>
+            <a:ext cx="7839718" cy="4632017"/>
+          </a:xfrm>
+          <a:prstGeom prst="rect">
+            <a:avLst/>
+          </a:prstGeom>
+        </p:spPr>
+      </p:pic>
+    </p:spTree>
+    <p:extLst>
+      <p:ext uri="{BB962C8B-B14F-4D97-AF65-F5344CB8AC3E}">
+        <p14:creationId xmlns:p14="http://schemas.microsoft.com/office/powerpoint/2010/main" val="3927654935"/>
+      </p:ext>
+    </p:extLst>
+  </p:cSld>
+  <p:clrMapOvr>
+    <a:masterClrMapping/>
+  </p:clrMapOvr>
+</p:sld>
+</file>
+
+<file path=ppt/slides/slide32.xml><?xml version="1.0" encoding="utf-8"?>
+<p:sld xmlns:a="http://schemas.openxmlformats.org/drawingml/2006/main" xmlns:r="http://schemas.openxmlformats.org/officeDocument/2006/relationships" xmlns:p="http://schemas.openxmlformats.org/presentationml/2006/main">
+  <p:cSld>
+    <p:spTree>
+      <p:nvGrpSpPr>
+        <p:cNvPr id="1" name=""/>
+        <p:cNvGrpSpPr/>
+        <p:nvPr/>
+      </p:nvGrpSpPr>
+      <p:grpSpPr>
+        <a:xfrm>
+          <a:off x="0" y="0"/>
+          <a:ext cx="0" cy="0"/>
+          <a:chOff x="0" y="0"/>
+          <a:chExt cx="0" cy="0"/>
+        </a:xfrm>
+      </p:grpSpPr>
+      <p:sp>
+        <p:nvSpPr>
+          <p:cNvPr id="2" name="Title 1"/>
+          <p:cNvSpPr>
+            <a:spLocks noGrp="1"/>
+          </p:cNvSpPr>
+          <p:nvPr>
+            <p:ph type="title"/>
+          </p:nvPr>
+        </p:nvSpPr>
         <p:spPr/>
         <p:txBody>
           <a:bodyPr/>
@@ -8534,7 +8357,7 @@
 </p:sld>
 </file>
 
-<file path=ppt/slides/slide32.xml><?xml version="1.0" encoding="utf-8"?>
+<file path=ppt/slides/slide33.xml><?xml version="1.0" encoding="utf-8"?>
 <p:sld xmlns:a="http://schemas.openxmlformats.org/drawingml/2006/main" xmlns:r="http://schemas.openxmlformats.org/officeDocument/2006/relationships" xmlns:p="http://schemas.openxmlformats.org/presentationml/2006/main">
   <p:cSld>
     <p:spTree>
@@ -8633,176 +8456,6 @@
 </p:sld>
 </file>
 
-<file path=ppt/slides/slide33.xml><?xml version="1.0" encoding="utf-8"?>
-<p:sld xmlns:a="http://schemas.openxmlformats.org/drawingml/2006/main" xmlns:r="http://schemas.openxmlformats.org/officeDocument/2006/relationships" xmlns:p="http://schemas.openxmlformats.org/presentationml/2006/main">
-  <p:cSld>
-    <p:spTree>
-      <p:nvGrpSpPr>
-        <p:cNvPr id="1" name=""/>
-        <p:cNvGrpSpPr/>
-        <p:nvPr/>
-      </p:nvGrpSpPr>
-      <p:grpSpPr>
-        <a:xfrm>
-          <a:off x="0" y="0"/>
-          <a:ext cx="0" cy="0"/>
-          <a:chOff x="0" y="0"/>
-          <a:chExt cx="0" cy="0"/>
-        </a:xfrm>
-      </p:grpSpPr>
-      <p:sp>
-        <p:nvSpPr>
-          <p:cNvPr id="2" name="Title 1"/>
-          <p:cNvSpPr>
-            <a:spLocks noGrp="1"/>
-          </p:cNvSpPr>
-          <p:nvPr>
-            <p:ph type="title"/>
-          </p:nvPr>
-        </p:nvSpPr>
-        <p:spPr/>
-        <p:txBody>
-          <a:bodyPr/>
-          <a:lstStyle/>
-          <a:p>
-            <a:pPr algn="ctr"/>
-            <a:r>
-              <a:rPr lang="nl-NL" dirty="0"/>
-              <a:t>Health</a:t>
-            </a:r>
-            <a:endParaRPr lang="en-US" dirty="0"/>
-          </a:p>
-        </p:txBody>
-      </p:sp>
-      <p:sp>
-        <p:nvSpPr>
-          <p:cNvPr id="5" name="Rectangle 4"/>
-          <p:cNvSpPr/>
-          <p:nvPr/>
-        </p:nvSpPr>
-        <p:spPr>
-          <a:xfrm>
-            <a:off x="2282825" y="1754417"/>
-            <a:ext cx="7626350" cy="2031325"/>
-          </a:xfrm>
-          <a:prstGeom prst="rect">
-            <a:avLst/>
-          </a:prstGeom>
-        </p:spPr>
-        <p:txBody>
-          <a:bodyPr wrap="square">
-            <a:spAutoFit/>
-          </a:bodyPr>
-          <a:lstStyle/>
-          <a:p>
-            <a:r>
-              <a:rPr lang="nl-NL" dirty="0"/>
-              <a:t>Standard </a:t>
-            </a:r>
-            <a:r>
-              <a:rPr lang="nl-NL" dirty="0" err="1"/>
-              <a:t>when</a:t>
-            </a:r>
-            <a:r>
-              <a:rPr lang="nl-NL" dirty="0"/>
-              <a:t> </a:t>
-            </a:r>
-            <a:r>
-              <a:rPr lang="nl-NL" dirty="0" err="1"/>
-              <a:t>importing</a:t>
-            </a:r>
-            <a:r>
-              <a:rPr lang="nl-NL" dirty="0"/>
-              <a:t> </a:t>
-            </a:r>
-            <a:r>
-              <a:rPr lang="nl-NL" i="1" dirty="0" err="1"/>
-              <a:t>smallrye</a:t>
-            </a:r>
-            <a:r>
-              <a:rPr lang="nl-NL" i="1" dirty="0"/>
-              <a:t>-health</a:t>
-            </a:r>
-            <a:r>
-              <a:rPr lang="nl-NL" dirty="0"/>
-              <a:t> </a:t>
-            </a:r>
-            <a:r>
-              <a:rPr lang="nl-NL" dirty="0" err="1"/>
-              <a:t>dependency</a:t>
-            </a:r>
-            <a:r>
-              <a:rPr lang="nl-NL" dirty="0"/>
-              <a:t> </a:t>
-            </a:r>
-            <a:endParaRPr lang="en-US" dirty="0"/>
-          </a:p>
-          <a:p>
-            <a:pPr marL="285750" indent="-285750">
-              <a:buFont typeface="Arial" panose="020B0604020202020204" pitchFamily="34" charset="0"/>
-              <a:buChar char="•"/>
-            </a:pPr>
-            <a:endParaRPr lang="en-US" dirty="0"/>
-          </a:p>
-          <a:p>
-            <a:pPr marL="285750" indent="-285750">
-              <a:buFont typeface="Arial" panose="020B0604020202020204" pitchFamily="34" charset="0"/>
-              <a:buChar char="•"/>
-            </a:pPr>
-            <a:r>
-              <a:rPr lang="en-US" dirty="0"/>
-              <a:t>/health/live - The application is up and running.</a:t>
-            </a:r>
-          </a:p>
-          <a:p>
-            <a:pPr marL="285750" indent="-285750">
-              <a:buFont typeface="Arial" panose="020B0604020202020204" pitchFamily="34" charset="0"/>
-              <a:buChar char="•"/>
-            </a:pPr>
-            <a:endParaRPr lang="en-US" dirty="0"/>
-          </a:p>
-          <a:p>
-            <a:pPr marL="285750" indent="-285750">
-              <a:buFont typeface="Arial" panose="020B0604020202020204" pitchFamily="34" charset="0"/>
-              <a:buChar char="•"/>
-            </a:pPr>
-            <a:r>
-              <a:rPr lang="en-US" dirty="0"/>
-              <a:t>/health/ready - The application is ready to serve requests.</a:t>
-            </a:r>
-          </a:p>
-          <a:p>
-            <a:pPr marL="285750" indent="-285750">
-              <a:buFont typeface="Arial" panose="020B0604020202020204" pitchFamily="34" charset="0"/>
-              <a:buChar char="•"/>
-            </a:pPr>
-            <a:endParaRPr lang="en-US" dirty="0"/>
-          </a:p>
-          <a:p>
-            <a:pPr marL="285750" indent="-285750">
-              <a:buFont typeface="Arial" panose="020B0604020202020204" pitchFamily="34" charset="0"/>
-              <a:buChar char="•"/>
-            </a:pPr>
-            <a:r>
-              <a:rPr lang="en-US" dirty="0"/>
-              <a:t>/health - Accumulating all health check procedures in the application.</a:t>
-            </a:r>
-          </a:p>
-        </p:txBody>
-      </p:sp>
-    </p:spTree>
-    <p:extLst>
-      <p:ext uri="{BB962C8B-B14F-4D97-AF65-F5344CB8AC3E}">
-        <p14:creationId xmlns:p14="http://schemas.microsoft.com/office/powerpoint/2010/main" val="3485197494"/>
-      </p:ext>
-    </p:extLst>
-  </p:cSld>
-  <p:clrMapOvr>
-    <a:masterClrMapping/>
-  </p:clrMapOvr>
-</p:sld>
-</file>
-
 <file path=ppt/slides/slide34.xml><?xml version="1.0" encoding="utf-8"?>
 <p:sld xmlns:a="http://schemas.openxmlformats.org/drawingml/2006/main" xmlns:r="http://schemas.openxmlformats.org/officeDocument/2006/relationships" xmlns:p="http://schemas.openxmlformats.org/presentationml/2006/main">
   <p:cSld>
@@ -8830,12 +8483,7 @@
             <p:ph type="title"/>
           </p:nvPr>
         </p:nvSpPr>
-        <p:spPr>
-          <a:xfrm>
-            <a:off x="582827" y="0"/>
-            <a:ext cx="10515600" cy="1325563"/>
-          </a:xfrm>
-        </p:spPr>
+        <p:spPr/>
         <p:txBody>
           <a:bodyPr/>
           <a:lstStyle/>
@@ -8849,59 +8497,34 @@
           </a:p>
         </p:txBody>
       </p:sp>
-      <p:pic>
-        <p:nvPicPr>
-          <p:cNvPr id="3" name="Picture 2"/>
-          <p:cNvPicPr>
-            <a:picLocks noChangeAspect="1"/>
-          </p:cNvPicPr>
+      <p:sp>
+        <p:nvSpPr>
+          <p:cNvPr id="5" name="Rectangle 4"/>
+          <p:cNvSpPr/>
           <p:nvPr/>
-        </p:nvPicPr>
-        <p:blipFill>
-          <a:blip r:embed="rId2"/>
-          <a:stretch>
-            <a:fillRect/>
-          </a:stretch>
-        </p:blipFill>
+        </p:nvSpPr>
         <p:spPr>
           <a:xfrm>
-            <a:off x="2480490" y="1925466"/>
-            <a:ext cx="6143625" cy="3781425"/>
+            <a:off x="2282825" y="1754417"/>
+            <a:ext cx="7626350" cy="2031325"/>
           </a:xfrm>
           <a:prstGeom prst="rect">
             <a:avLst/>
           </a:prstGeom>
         </p:spPr>
-      </p:pic>
-      <p:sp>
-        <p:nvSpPr>
-          <p:cNvPr id="4" name="TextBox 3"/>
-          <p:cNvSpPr txBox="1"/>
-          <p:nvPr/>
-        </p:nvSpPr>
-        <p:spPr>
-          <a:xfrm>
-            <a:off x="2413687" y="1325563"/>
-            <a:ext cx="7977761" cy="369332"/>
-          </a:xfrm>
-          <a:prstGeom prst="rect">
-            <a:avLst/>
-          </a:prstGeom>
-          <a:noFill/>
-        </p:spPr>
-        <p:txBody>
-          <a:bodyPr wrap="none" rtlCol="0">
+        <p:txBody>
+          <a:bodyPr wrap="square">
             <a:spAutoFit/>
           </a:bodyPr>
           <a:lstStyle/>
           <a:p>
             <a:r>
               <a:rPr lang="nl-NL" dirty="0"/>
-              <a:t>Create </a:t>
+              <a:t>Standard </a:t>
             </a:r>
             <a:r>
               <a:rPr lang="nl-NL" dirty="0" err="1"/>
-              <a:t>your</a:t>
+              <a:t>when</a:t>
             </a:r>
             <a:r>
               <a:rPr lang="nl-NL" dirty="0"/>
@@ -8909,36 +8532,91 @@
             </a:r>
             <a:r>
               <a:rPr lang="nl-NL" dirty="0" err="1"/>
-              <a:t>own</a:t>
+              <a:t>importing</a:t>
             </a:r>
             <a:r>
               <a:rPr lang="nl-NL" dirty="0"/>
-              <a:t> health </a:t>
+              <a:t> </a:t>
+            </a:r>
+            <a:r>
+              <a:rPr lang="nl-NL" i="1" dirty="0" err="1"/>
+              <a:t>smallrye</a:t>
+            </a:r>
+            <a:r>
+              <a:rPr lang="nl-NL" i="1" dirty="0"/>
+              <a:t>-health</a:t>
+            </a:r>
+            <a:r>
+              <a:rPr lang="nl-NL" dirty="0"/>
+              <a:t> </a:t>
             </a:r>
             <a:r>
               <a:rPr lang="nl-NL" dirty="0" err="1"/>
-              <a:t>endpoint</a:t>
+              <a:t>dependency</a:t>
             </a:r>
             <a:r>
               <a:rPr lang="nl-NL" dirty="0"/>
-              <a:t> (shows up on health/live but </a:t>
-            </a:r>
-            <a:r>
-              <a:rPr lang="nl-NL" dirty="0" err="1"/>
-              <a:t>not</a:t>
-            </a:r>
-            <a:r>
-              <a:rPr lang="nl-NL" dirty="0"/>
-              <a:t> on health/ready)</a:t>
+              <a:t> </a:t>
             </a:r>
             <a:endParaRPr lang="en-US" dirty="0"/>
+          </a:p>
+          <a:p>
+            <a:pPr marL="285750" indent="-285750">
+              <a:buFont typeface="Arial" panose="020B0604020202020204" pitchFamily="34" charset="0"/>
+              <a:buChar char="•"/>
+            </a:pPr>
+            <a:endParaRPr lang="en-US" dirty="0"/>
+          </a:p>
+          <a:p>
+            <a:pPr marL="285750" indent="-285750">
+              <a:buFont typeface="Arial" panose="020B0604020202020204" pitchFamily="34" charset="0"/>
+              <a:buChar char="•"/>
+            </a:pPr>
+            <a:r>
+              <a:rPr lang="en-US" dirty="0"/>
+              <a:t>/health/live - The application is up and running.</a:t>
+            </a:r>
+          </a:p>
+          <a:p>
+            <a:pPr marL="285750" indent="-285750">
+              <a:buFont typeface="Arial" panose="020B0604020202020204" pitchFamily="34" charset="0"/>
+              <a:buChar char="•"/>
+            </a:pPr>
+            <a:endParaRPr lang="en-US" dirty="0"/>
+          </a:p>
+          <a:p>
+            <a:pPr marL="285750" indent="-285750">
+              <a:buFont typeface="Arial" panose="020B0604020202020204" pitchFamily="34" charset="0"/>
+              <a:buChar char="•"/>
+            </a:pPr>
+            <a:r>
+              <a:rPr lang="en-US" dirty="0"/>
+              <a:t>/health/ready - The application is ready to serve requests.</a:t>
+            </a:r>
+          </a:p>
+          <a:p>
+            <a:pPr marL="285750" indent="-285750">
+              <a:buFont typeface="Arial" panose="020B0604020202020204" pitchFamily="34" charset="0"/>
+              <a:buChar char="•"/>
+            </a:pPr>
+            <a:endParaRPr lang="en-US" dirty="0"/>
+          </a:p>
+          <a:p>
+            <a:pPr marL="285750" indent="-285750">
+              <a:buFont typeface="Arial" panose="020B0604020202020204" pitchFamily="34" charset="0"/>
+              <a:buChar char="•"/>
+            </a:pPr>
+            <a:r>
+              <a:rPr lang="en-US" dirty="0"/>
+              <a:t>/health - Accumulating all health check procedures in the application.</a:t>
+            </a:r>
           </a:p>
         </p:txBody>
       </p:sp>
     </p:spTree>
     <p:extLst>
       <p:ext uri="{BB962C8B-B14F-4D97-AF65-F5344CB8AC3E}">
-        <p14:creationId xmlns:p14="http://schemas.microsoft.com/office/powerpoint/2010/main" val="1983377409"/>
+        <p14:creationId xmlns:p14="http://schemas.microsoft.com/office/powerpoint/2010/main" val="3485197494"/>
       </p:ext>
     </p:extLst>
   </p:cSld>
@@ -8994,43 +8672,9 @@
           </a:p>
         </p:txBody>
       </p:sp>
-      <p:sp>
-        <p:nvSpPr>
-          <p:cNvPr id="4" name="TextBox 3"/>
-          <p:cNvSpPr txBox="1"/>
-          <p:nvPr/>
-        </p:nvSpPr>
-        <p:spPr>
-          <a:xfrm>
-            <a:off x="2578572" y="1553000"/>
-            <a:ext cx="3044423" cy="523220"/>
-          </a:xfrm>
-          <a:prstGeom prst="rect">
-            <a:avLst/>
-          </a:prstGeom>
-          <a:noFill/>
-        </p:spPr>
-        <p:txBody>
-          <a:bodyPr wrap="none" rtlCol="0">
-            <a:spAutoFit/>
-          </a:bodyPr>
-          <a:lstStyle/>
-          <a:p>
-            <a:r>
-              <a:rPr lang="nl-NL" sz="2800" dirty="0"/>
-              <a:t>Readiness </a:t>
-            </a:r>
-            <a:r>
-              <a:rPr lang="nl-NL" sz="2800" dirty="0" err="1"/>
-              <a:t>Endpoint</a:t>
-            </a:r>
-            <a:endParaRPr lang="en-US" sz="2800" dirty="0"/>
-          </a:p>
-        </p:txBody>
-      </p:sp>
       <p:pic>
         <p:nvPicPr>
-          <p:cNvPr id="5" name="Picture 4"/>
+          <p:cNvPr id="3" name="Picture 2"/>
           <p:cNvPicPr>
             <a:picLocks noChangeAspect="1"/>
           </p:cNvPicPr>
@@ -9044,18 +8688,80 @@
         </p:blipFill>
         <p:spPr>
           <a:xfrm>
-            <a:off x="2578572" y="2132699"/>
-            <a:ext cx="7496175" cy="3762375"/>
+            <a:off x="2480490" y="1925466"/>
+            <a:ext cx="6143625" cy="3781425"/>
           </a:xfrm>
           <a:prstGeom prst="rect">
             <a:avLst/>
           </a:prstGeom>
         </p:spPr>
       </p:pic>
+      <p:sp>
+        <p:nvSpPr>
+          <p:cNvPr id="4" name="TextBox 3"/>
+          <p:cNvSpPr txBox="1"/>
+          <p:nvPr/>
+        </p:nvSpPr>
+        <p:spPr>
+          <a:xfrm>
+            <a:off x="2413687" y="1325563"/>
+            <a:ext cx="7977761" cy="369332"/>
+          </a:xfrm>
+          <a:prstGeom prst="rect">
+            <a:avLst/>
+          </a:prstGeom>
+          <a:noFill/>
+        </p:spPr>
+        <p:txBody>
+          <a:bodyPr wrap="none" rtlCol="0">
+            <a:spAutoFit/>
+          </a:bodyPr>
+          <a:lstStyle/>
+          <a:p>
+            <a:r>
+              <a:rPr lang="nl-NL" dirty="0"/>
+              <a:t>Create </a:t>
+            </a:r>
+            <a:r>
+              <a:rPr lang="nl-NL" dirty="0" err="1"/>
+              <a:t>your</a:t>
+            </a:r>
+            <a:r>
+              <a:rPr lang="nl-NL" dirty="0"/>
+              <a:t> </a:t>
+            </a:r>
+            <a:r>
+              <a:rPr lang="nl-NL" dirty="0" err="1"/>
+              <a:t>own</a:t>
+            </a:r>
+            <a:r>
+              <a:rPr lang="nl-NL" dirty="0"/>
+              <a:t> health </a:t>
+            </a:r>
+            <a:r>
+              <a:rPr lang="nl-NL" dirty="0" err="1"/>
+              <a:t>endpoint</a:t>
+            </a:r>
+            <a:r>
+              <a:rPr lang="nl-NL" dirty="0"/>
+              <a:t> (shows up on health/live but </a:t>
+            </a:r>
+            <a:r>
+              <a:rPr lang="nl-NL" dirty="0" err="1"/>
+              <a:t>not</a:t>
+            </a:r>
+            <a:r>
+              <a:rPr lang="nl-NL" dirty="0"/>
+              <a:t> on health/ready)</a:t>
+            </a:r>
+            <a:endParaRPr lang="en-US" dirty="0"/>
+          </a:p>
+        </p:txBody>
+      </p:sp>
     </p:spTree>
     <p:extLst>
       <p:ext uri="{BB962C8B-B14F-4D97-AF65-F5344CB8AC3E}">
-        <p14:creationId xmlns:p14="http://schemas.microsoft.com/office/powerpoint/2010/main" val="1676996530"/>
+        <p14:creationId xmlns:p14="http://schemas.microsoft.com/office/powerpoint/2010/main" val="1983377409"/>
       </p:ext>
     </p:extLst>
   </p:cSld>
@@ -9104,16 +8810,50 @@
           <a:p>
             <a:pPr algn="ctr"/>
             <a:r>
-              <a:rPr lang="nl-NL" dirty="0" err="1"/>
-              <a:t>Metrics</a:t>
+              <a:rPr lang="nl-NL" dirty="0"/>
+              <a:t>Health</a:t>
             </a:r>
             <a:endParaRPr lang="en-US" dirty="0"/>
+          </a:p>
+        </p:txBody>
+      </p:sp>
+      <p:sp>
+        <p:nvSpPr>
+          <p:cNvPr id="4" name="TextBox 3"/>
+          <p:cNvSpPr txBox="1"/>
+          <p:nvPr/>
+        </p:nvSpPr>
+        <p:spPr>
+          <a:xfrm>
+            <a:off x="2578572" y="1553000"/>
+            <a:ext cx="3044423" cy="523220"/>
+          </a:xfrm>
+          <a:prstGeom prst="rect">
+            <a:avLst/>
+          </a:prstGeom>
+          <a:noFill/>
+        </p:spPr>
+        <p:txBody>
+          <a:bodyPr wrap="none" rtlCol="0">
+            <a:spAutoFit/>
+          </a:bodyPr>
+          <a:lstStyle/>
+          <a:p>
+            <a:r>
+              <a:rPr lang="nl-NL" sz="2800" dirty="0"/>
+              <a:t>Readiness </a:t>
+            </a:r>
+            <a:r>
+              <a:rPr lang="nl-NL" sz="2800" dirty="0" err="1"/>
+              <a:t>Endpoint</a:t>
+            </a:r>
+            <a:endParaRPr lang="en-US" sz="2800" dirty="0"/>
           </a:p>
         </p:txBody>
       </p:sp>
       <p:pic>
         <p:nvPicPr>
-          <p:cNvPr id="3" name="Picture 2"/>
+          <p:cNvPr id="5" name="Picture 4"/>
           <p:cNvPicPr>
             <a:picLocks noChangeAspect="1"/>
           </p:cNvPicPr>
@@ -9127,64 +8867,18 @@
         </p:blipFill>
         <p:spPr>
           <a:xfrm>
-            <a:off x="582827" y="1934895"/>
-            <a:ext cx="11318789" cy="3367151"/>
+            <a:off x="2578572" y="2132699"/>
+            <a:ext cx="7496175" cy="3762375"/>
           </a:xfrm>
           <a:prstGeom prst="rect">
             <a:avLst/>
           </a:prstGeom>
         </p:spPr>
       </p:pic>
-      <p:sp>
-        <p:nvSpPr>
-          <p:cNvPr id="6" name="TextBox 5"/>
-          <p:cNvSpPr txBox="1"/>
-          <p:nvPr/>
-        </p:nvSpPr>
-        <p:spPr>
-          <a:xfrm>
-            <a:off x="3155093" y="1181149"/>
-            <a:ext cx="4910062" cy="523220"/>
-          </a:xfrm>
-          <a:prstGeom prst="rect">
-            <a:avLst/>
-          </a:prstGeom>
-          <a:noFill/>
-        </p:spPr>
-        <p:txBody>
-          <a:bodyPr wrap="none" rtlCol="0">
-            <a:spAutoFit/>
-          </a:bodyPr>
-          <a:lstStyle/>
-          <a:p>
-            <a:r>
-              <a:rPr lang="nl-NL" sz="2800" dirty="0" err="1"/>
-              <a:t>Exposed</a:t>
-            </a:r>
-            <a:r>
-              <a:rPr lang="nl-NL" sz="2800" dirty="0"/>
-              <a:t> on /</a:t>
-            </a:r>
-            <a:r>
-              <a:rPr lang="nl-NL" sz="2800" dirty="0" err="1"/>
-              <a:t>metrics</a:t>
-            </a:r>
-            <a:r>
-              <a:rPr lang="nl-NL" sz="2800" dirty="0"/>
-              <a:t>/</a:t>
-            </a:r>
-            <a:r>
-              <a:rPr lang="nl-NL" sz="2800" dirty="0" err="1"/>
-              <a:t>application</a:t>
-            </a:r>
-            <a:endParaRPr lang="en-US" sz="2800" dirty="0"/>
-          </a:p>
-        </p:txBody>
-      </p:sp>
     </p:spTree>
     <p:extLst>
       <p:ext uri="{BB962C8B-B14F-4D97-AF65-F5344CB8AC3E}">
-        <p14:creationId xmlns:p14="http://schemas.microsoft.com/office/powerpoint/2010/main" val="381714785"/>
+        <p14:creationId xmlns:p14="http://schemas.microsoft.com/office/powerpoint/2010/main" val="1676996530"/>
       </p:ext>
     </p:extLst>
   </p:cSld>
@@ -9240,6 +8934,135 @@
           </a:p>
         </p:txBody>
       </p:sp>
+      <p:pic>
+        <p:nvPicPr>
+          <p:cNvPr id="3" name="Picture 2"/>
+          <p:cNvPicPr>
+            <a:picLocks noChangeAspect="1"/>
+          </p:cNvPicPr>
+          <p:nvPr/>
+        </p:nvPicPr>
+        <p:blipFill>
+          <a:blip r:embed="rId2"/>
+          <a:stretch>
+            <a:fillRect/>
+          </a:stretch>
+        </p:blipFill>
+        <p:spPr>
+          <a:xfrm>
+            <a:off x="582827" y="1934895"/>
+            <a:ext cx="11318789" cy="3367151"/>
+          </a:xfrm>
+          <a:prstGeom prst="rect">
+            <a:avLst/>
+          </a:prstGeom>
+        </p:spPr>
+      </p:pic>
+      <p:sp>
+        <p:nvSpPr>
+          <p:cNvPr id="6" name="TextBox 5"/>
+          <p:cNvSpPr txBox="1"/>
+          <p:nvPr/>
+        </p:nvSpPr>
+        <p:spPr>
+          <a:xfrm>
+            <a:off x="3155093" y="1181149"/>
+            <a:ext cx="4910062" cy="523220"/>
+          </a:xfrm>
+          <a:prstGeom prst="rect">
+            <a:avLst/>
+          </a:prstGeom>
+          <a:noFill/>
+        </p:spPr>
+        <p:txBody>
+          <a:bodyPr wrap="none" rtlCol="0">
+            <a:spAutoFit/>
+          </a:bodyPr>
+          <a:lstStyle/>
+          <a:p>
+            <a:r>
+              <a:rPr lang="nl-NL" sz="2800" dirty="0" err="1"/>
+              <a:t>Exposed</a:t>
+            </a:r>
+            <a:r>
+              <a:rPr lang="nl-NL" sz="2800" dirty="0"/>
+              <a:t> on /</a:t>
+            </a:r>
+            <a:r>
+              <a:rPr lang="nl-NL" sz="2800" dirty="0" err="1"/>
+              <a:t>metrics</a:t>
+            </a:r>
+            <a:r>
+              <a:rPr lang="nl-NL" sz="2800" dirty="0"/>
+              <a:t>/</a:t>
+            </a:r>
+            <a:r>
+              <a:rPr lang="nl-NL" sz="2800" dirty="0" err="1"/>
+              <a:t>application</a:t>
+            </a:r>
+            <a:endParaRPr lang="en-US" sz="2800" dirty="0"/>
+          </a:p>
+        </p:txBody>
+      </p:sp>
+    </p:spTree>
+    <p:extLst>
+      <p:ext uri="{BB962C8B-B14F-4D97-AF65-F5344CB8AC3E}">
+        <p14:creationId xmlns:p14="http://schemas.microsoft.com/office/powerpoint/2010/main" val="381714785"/>
+      </p:ext>
+    </p:extLst>
+  </p:cSld>
+  <p:clrMapOvr>
+    <a:masterClrMapping/>
+  </p:clrMapOvr>
+</p:sld>
+</file>
+
+<file path=ppt/slides/slide38.xml><?xml version="1.0" encoding="utf-8"?>
+<p:sld xmlns:a="http://schemas.openxmlformats.org/drawingml/2006/main" xmlns:r="http://schemas.openxmlformats.org/officeDocument/2006/relationships" xmlns:p="http://schemas.openxmlformats.org/presentationml/2006/main">
+  <p:cSld>
+    <p:spTree>
+      <p:nvGrpSpPr>
+        <p:cNvPr id="1" name=""/>
+        <p:cNvGrpSpPr/>
+        <p:nvPr/>
+      </p:nvGrpSpPr>
+      <p:grpSpPr>
+        <a:xfrm>
+          <a:off x="0" y="0"/>
+          <a:ext cx="0" cy="0"/>
+          <a:chOff x="0" y="0"/>
+          <a:chExt cx="0" cy="0"/>
+        </a:xfrm>
+      </p:grpSpPr>
+      <p:sp>
+        <p:nvSpPr>
+          <p:cNvPr id="2" name="Title 1"/>
+          <p:cNvSpPr>
+            <a:spLocks noGrp="1"/>
+          </p:cNvSpPr>
+          <p:nvPr>
+            <p:ph type="title"/>
+          </p:nvPr>
+        </p:nvSpPr>
+        <p:spPr>
+          <a:xfrm>
+            <a:off x="582827" y="0"/>
+            <a:ext cx="10515600" cy="1325563"/>
+          </a:xfrm>
+        </p:spPr>
+        <p:txBody>
+          <a:bodyPr/>
+          <a:lstStyle/>
+          <a:p>
+            <a:pPr algn="ctr"/>
+            <a:r>
+              <a:rPr lang="nl-NL" dirty="0" err="1"/>
+              <a:t>Metrics</a:t>
+            </a:r>
+            <a:endParaRPr lang="en-US" dirty="0"/>
+          </a:p>
+        </p:txBody>
+      </p:sp>
       <p:sp>
         <p:nvSpPr>
           <p:cNvPr id="6" name="TextBox 5"/>
@@ -9369,7 +9192,7 @@
 </p:sld>
 </file>
 
-<file path=ppt/slides/slide38.xml><?xml version="1.0" encoding="utf-8"?>
+<file path=ppt/slides/slide39.xml><?xml version="1.0" encoding="utf-8"?>
 <p:sld xmlns:a="http://schemas.openxmlformats.org/drawingml/2006/main" xmlns:r="http://schemas.openxmlformats.org/officeDocument/2006/relationships" xmlns:p="http://schemas.openxmlformats.org/presentationml/2006/main">
   <p:cSld>
     <p:spTree>
@@ -9503,7 +9326,171 @@
 </p:sld>
 </file>
 
-<file path=ppt/slides/slide39.xml><?xml version="1.0" encoding="utf-8"?>
+<file path=ppt/slides/slide4.xml><?xml version="1.0" encoding="utf-8"?>
+<p:sld xmlns:a="http://schemas.openxmlformats.org/drawingml/2006/main" xmlns:r="http://schemas.openxmlformats.org/officeDocument/2006/relationships" xmlns:p="http://schemas.openxmlformats.org/presentationml/2006/main">
+  <p:cSld>
+    <p:spTree>
+      <p:nvGrpSpPr>
+        <p:cNvPr id="1" name=""/>
+        <p:cNvGrpSpPr/>
+        <p:nvPr/>
+      </p:nvGrpSpPr>
+      <p:grpSpPr>
+        <a:xfrm>
+          <a:off x="0" y="0"/>
+          <a:ext cx="0" cy="0"/>
+          <a:chOff x="0" y="0"/>
+          <a:chExt cx="0" cy="0"/>
+        </a:xfrm>
+      </p:grpSpPr>
+      <p:sp>
+        <p:nvSpPr>
+          <p:cNvPr id="2" name="Title 1">
+            <a:extLst>
+              <a:ext uri="{FF2B5EF4-FFF2-40B4-BE49-F238E27FC236}">
+                <a16:creationId xmlns:a16="http://schemas.microsoft.com/office/drawing/2014/main" id="{AB28A427-F098-45BF-989A-3886683A49F6}"/>
+              </a:ext>
+            </a:extLst>
+          </p:cNvPr>
+          <p:cNvSpPr>
+            <a:spLocks noGrp="1"/>
+          </p:cNvSpPr>
+          <p:nvPr>
+            <p:ph type="title"/>
+          </p:nvPr>
+        </p:nvSpPr>
+        <p:spPr/>
+        <p:txBody>
+          <a:bodyPr/>
+          <a:lstStyle/>
+          <a:p>
+            <a:pPr algn="ctr"/>
+            <a:r>
+              <a:rPr lang="nl-NL" dirty="0"/>
+              <a:t>Starting the app </a:t>
+            </a:r>
+          </a:p>
+        </p:txBody>
+      </p:sp>
+      <p:sp>
+        <p:nvSpPr>
+          <p:cNvPr id="4" name="TextBox 3">
+            <a:extLst>
+              <a:ext uri="{FF2B5EF4-FFF2-40B4-BE49-F238E27FC236}">
+                <a16:creationId xmlns:a16="http://schemas.microsoft.com/office/drawing/2014/main" id="{AA5F2D7D-B27E-473C-93F6-E54683E864F3}"/>
+              </a:ext>
+            </a:extLst>
+          </p:cNvPr>
+          <p:cNvSpPr txBox="1"/>
+          <p:nvPr/>
+        </p:nvSpPr>
+        <p:spPr>
+          <a:xfrm>
+            <a:off x="2977217" y="2162490"/>
+            <a:ext cx="6563015" cy="646331"/>
+          </a:xfrm>
+          <a:prstGeom prst="rect">
+            <a:avLst/>
+          </a:prstGeom>
+          <a:noFill/>
+        </p:spPr>
+        <p:txBody>
+          <a:bodyPr wrap="none" rtlCol="0">
+            <a:spAutoFit/>
+          </a:bodyPr>
+          <a:lstStyle/>
+          <a:p>
+            <a:r>
+              <a:rPr lang="nl-NL" sz="3600" dirty="0">
+                <a:latin typeface="Courier New" panose="02070309020205020404" pitchFamily="49" charset="0"/>
+                <a:cs typeface="Courier New" panose="02070309020205020404" pitchFamily="49" charset="0"/>
+              </a:rPr>
+              <a:t>mvn compile quarkus:dev</a:t>
+            </a:r>
+          </a:p>
+        </p:txBody>
+      </p:sp>
+      <p:sp>
+        <p:nvSpPr>
+          <p:cNvPr id="5" name="Rectangle 4">
+            <a:extLst>
+              <a:ext uri="{FF2B5EF4-FFF2-40B4-BE49-F238E27FC236}">
+                <a16:creationId xmlns:a16="http://schemas.microsoft.com/office/drawing/2014/main" id="{E6FCD8BF-C795-48D3-AE64-AE1D58863DA2}"/>
+              </a:ext>
+            </a:extLst>
+          </p:cNvPr>
+          <p:cNvSpPr/>
+          <p:nvPr/>
+        </p:nvSpPr>
+        <p:spPr>
+          <a:xfrm>
+            <a:off x="3283467" y="3470039"/>
+            <a:ext cx="5625066" cy="923330"/>
+          </a:xfrm>
+          <a:prstGeom prst="rect">
+            <a:avLst/>
+          </a:prstGeom>
+          <a:noFill/>
+        </p:spPr>
+        <p:txBody>
+          <a:bodyPr wrap="none" lIns="91440" tIns="45720" rIns="91440" bIns="45720">
+            <a:prstTxWarp prst="textDeflate">
+              <a:avLst/>
+            </a:prstTxWarp>
+            <a:spAutoFit/>
+          </a:bodyPr>
+          <a:lstStyle/>
+          <a:p>
+            <a:pPr algn="ctr"/>
+            <a:r>
+              <a:rPr lang="en-US" sz="5400" b="1" cap="none" spc="0" dirty="0">
+                <a:ln w="12700" cmpd="sng">
+                  <a:solidFill>
+                    <a:schemeClr val="accent4"/>
+                  </a:solidFill>
+                  <a:prstDash val="solid"/>
+                </a:ln>
+                <a:gradFill>
+                  <a:gsLst>
+                    <a:gs pos="0">
+                      <a:schemeClr val="accent4"/>
+                    </a:gs>
+                    <a:gs pos="4000">
+                      <a:schemeClr val="accent4">
+                        <a:lumMod val="60000"/>
+                        <a:lumOff val="40000"/>
+                      </a:schemeClr>
+                    </a:gs>
+                    <a:gs pos="87000">
+                      <a:schemeClr val="accent4">
+                        <a:lumMod val="20000"/>
+                        <a:lumOff val="80000"/>
+                      </a:schemeClr>
+                    </a:gs>
+                  </a:gsLst>
+                  <a:lin ang="5400000"/>
+                </a:gradFill>
+                <a:effectLst/>
+              </a:rPr>
+              <a:t>Enables live coding</a:t>
+            </a:r>
+          </a:p>
+        </p:txBody>
+      </p:sp>
+    </p:spTree>
+    <p:extLst>
+      <p:ext uri="{BB962C8B-B14F-4D97-AF65-F5344CB8AC3E}">
+        <p14:creationId xmlns:p14="http://schemas.microsoft.com/office/powerpoint/2010/main" val="902481035"/>
+      </p:ext>
+    </p:extLst>
+  </p:cSld>
+  <p:clrMapOvr>
+    <a:masterClrMapping/>
+  </p:clrMapOvr>
+</p:sld>
+</file>
+
+<file path=ppt/slides/slide40.xml><?xml version="1.0" encoding="utf-8"?>
 <p:sld xmlns:a="http://schemas.openxmlformats.org/drawingml/2006/main" xmlns:r="http://schemas.openxmlformats.org/officeDocument/2006/relationships" xmlns:p="http://schemas.openxmlformats.org/presentationml/2006/main">
   <p:cSld>
     <p:spTree>
@@ -9613,171 +9600,7 @@
 </p:sld>
 </file>
 
-<file path=ppt/slides/slide4.xml><?xml version="1.0" encoding="utf-8"?>
-<p:sld xmlns:a="http://schemas.openxmlformats.org/drawingml/2006/main" xmlns:r="http://schemas.openxmlformats.org/officeDocument/2006/relationships" xmlns:p="http://schemas.openxmlformats.org/presentationml/2006/main">
-  <p:cSld>
-    <p:spTree>
-      <p:nvGrpSpPr>
-        <p:cNvPr id="1" name=""/>
-        <p:cNvGrpSpPr/>
-        <p:nvPr/>
-      </p:nvGrpSpPr>
-      <p:grpSpPr>
-        <a:xfrm>
-          <a:off x="0" y="0"/>
-          <a:ext cx="0" cy="0"/>
-          <a:chOff x="0" y="0"/>
-          <a:chExt cx="0" cy="0"/>
-        </a:xfrm>
-      </p:grpSpPr>
-      <p:sp>
-        <p:nvSpPr>
-          <p:cNvPr id="2" name="Title 1">
-            <a:extLst>
-              <a:ext uri="{FF2B5EF4-FFF2-40B4-BE49-F238E27FC236}">
-                <a16:creationId xmlns:a16="http://schemas.microsoft.com/office/drawing/2014/main" id="{AB28A427-F098-45BF-989A-3886683A49F6}"/>
-              </a:ext>
-            </a:extLst>
-          </p:cNvPr>
-          <p:cNvSpPr>
-            <a:spLocks noGrp="1"/>
-          </p:cNvSpPr>
-          <p:nvPr>
-            <p:ph type="title"/>
-          </p:nvPr>
-        </p:nvSpPr>
-        <p:spPr/>
-        <p:txBody>
-          <a:bodyPr/>
-          <a:lstStyle/>
-          <a:p>
-            <a:pPr algn="ctr"/>
-            <a:r>
-              <a:rPr lang="nl-NL" dirty="0"/>
-              <a:t>Starting the app </a:t>
-            </a:r>
-          </a:p>
-        </p:txBody>
-      </p:sp>
-      <p:sp>
-        <p:nvSpPr>
-          <p:cNvPr id="4" name="TextBox 3">
-            <a:extLst>
-              <a:ext uri="{FF2B5EF4-FFF2-40B4-BE49-F238E27FC236}">
-                <a16:creationId xmlns:a16="http://schemas.microsoft.com/office/drawing/2014/main" id="{AA5F2D7D-B27E-473C-93F6-E54683E864F3}"/>
-              </a:ext>
-            </a:extLst>
-          </p:cNvPr>
-          <p:cNvSpPr txBox="1"/>
-          <p:nvPr/>
-        </p:nvSpPr>
-        <p:spPr>
-          <a:xfrm>
-            <a:off x="2977217" y="2162490"/>
-            <a:ext cx="6563015" cy="646331"/>
-          </a:xfrm>
-          <a:prstGeom prst="rect">
-            <a:avLst/>
-          </a:prstGeom>
-          <a:noFill/>
-        </p:spPr>
-        <p:txBody>
-          <a:bodyPr wrap="none" rtlCol="0">
-            <a:spAutoFit/>
-          </a:bodyPr>
-          <a:lstStyle/>
-          <a:p>
-            <a:r>
-              <a:rPr lang="nl-NL" sz="3600" dirty="0">
-                <a:latin typeface="Courier New" panose="02070309020205020404" pitchFamily="49" charset="0"/>
-                <a:cs typeface="Courier New" panose="02070309020205020404" pitchFamily="49" charset="0"/>
-              </a:rPr>
-              <a:t>mvn compile quarkus:dev</a:t>
-            </a:r>
-          </a:p>
-        </p:txBody>
-      </p:sp>
-      <p:sp>
-        <p:nvSpPr>
-          <p:cNvPr id="5" name="Rectangle 4">
-            <a:extLst>
-              <a:ext uri="{FF2B5EF4-FFF2-40B4-BE49-F238E27FC236}">
-                <a16:creationId xmlns:a16="http://schemas.microsoft.com/office/drawing/2014/main" id="{E6FCD8BF-C795-48D3-AE64-AE1D58863DA2}"/>
-              </a:ext>
-            </a:extLst>
-          </p:cNvPr>
-          <p:cNvSpPr/>
-          <p:nvPr/>
-        </p:nvSpPr>
-        <p:spPr>
-          <a:xfrm>
-            <a:off x="3283467" y="3470039"/>
-            <a:ext cx="5625066" cy="923330"/>
-          </a:xfrm>
-          <a:prstGeom prst="rect">
-            <a:avLst/>
-          </a:prstGeom>
-          <a:noFill/>
-        </p:spPr>
-        <p:txBody>
-          <a:bodyPr wrap="none" lIns="91440" tIns="45720" rIns="91440" bIns="45720">
-            <a:prstTxWarp prst="textDeflate">
-              <a:avLst/>
-            </a:prstTxWarp>
-            <a:spAutoFit/>
-          </a:bodyPr>
-          <a:lstStyle/>
-          <a:p>
-            <a:pPr algn="ctr"/>
-            <a:r>
-              <a:rPr lang="en-US" sz="5400" b="1" cap="none" spc="0" dirty="0">
-                <a:ln w="12700" cmpd="sng">
-                  <a:solidFill>
-                    <a:schemeClr val="accent4"/>
-                  </a:solidFill>
-                  <a:prstDash val="solid"/>
-                </a:ln>
-                <a:gradFill>
-                  <a:gsLst>
-                    <a:gs pos="0">
-                      <a:schemeClr val="accent4"/>
-                    </a:gs>
-                    <a:gs pos="4000">
-                      <a:schemeClr val="accent4">
-                        <a:lumMod val="60000"/>
-                        <a:lumOff val="40000"/>
-                      </a:schemeClr>
-                    </a:gs>
-                    <a:gs pos="87000">
-                      <a:schemeClr val="accent4">
-                        <a:lumMod val="20000"/>
-                        <a:lumOff val="80000"/>
-                      </a:schemeClr>
-                    </a:gs>
-                  </a:gsLst>
-                  <a:lin ang="5400000"/>
-                </a:gradFill>
-                <a:effectLst/>
-              </a:rPr>
-              <a:t>Enables live coding</a:t>
-            </a:r>
-          </a:p>
-        </p:txBody>
-      </p:sp>
-    </p:spTree>
-    <p:extLst>
-      <p:ext uri="{BB962C8B-B14F-4D97-AF65-F5344CB8AC3E}">
-        <p14:creationId xmlns:p14="http://schemas.microsoft.com/office/powerpoint/2010/main" val="902481035"/>
-      </p:ext>
-    </p:extLst>
-  </p:cSld>
-  <p:clrMapOvr>
-    <a:masterClrMapping/>
-  </p:clrMapOvr>
-</p:sld>
-</file>
-
-<file path=ppt/slides/slide40.xml><?xml version="1.0" encoding="utf-8"?>
+<file path=ppt/slides/slide41.xml><?xml version="1.0" encoding="utf-8"?>
 <p:sld xmlns:a="http://schemas.openxmlformats.org/drawingml/2006/main" xmlns:r="http://schemas.openxmlformats.org/officeDocument/2006/relationships" xmlns:p="http://schemas.openxmlformats.org/presentationml/2006/main">
   <p:cSld>
     <p:spTree>
@@ -10187,7 +10010,7 @@
 </p:sld>
 </file>
 
-<file path=ppt/slides/slide41.xml><?xml version="1.0" encoding="utf-8"?>
+<file path=ppt/slides/slide42.xml><?xml version="1.0" encoding="utf-8"?>
 <p:sld xmlns:a="http://schemas.openxmlformats.org/drawingml/2006/main" xmlns:r="http://schemas.openxmlformats.org/officeDocument/2006/relationships" xmlns:p="http://schemas.openxmlformats.org/presentationml/2006/main">
   <p:cSld>
     <p:spTree>
@@ -10320,7 +10143,7 @@
 </p:sld>
 </file>
 
-<file path=ppt/slides/slide42.xml><?xml version="1.0" encoding="utf-8"?>
+<file path=ppt/slides/slide43.xml><?xml version="1.0" encoding="utf-8"?>
 <p:sld xmlns:a="http://schemas.openxmlformats.org/drawingml/2006/main" xmlns:r="http://schemas.openxmlformats.org/officeDocument/2006/relationships" xmlns:p="http://schemas.openxmlformats.org/presentationml/2006/main">
   <p:cSld>
     <p:spTree>
@@ -10437,7 +10260,7 @@
 </p:sld>
 </file>
 
-<file path=ppt/slides/slide43.xml><?xml version="1.0" encoding="utf-8"?>
+<file path=ppt/slides/slide44.xml><?xml version="1.0" encoding="utf-8"?>
 <p:sld xmlns:a="http://schemas.openxmlformats.org/drawingml/2006/main" xmlns:r="http://schemas.openxmlformats.org/officeDocument/2006/relationships" xmlns:p="http://schemas.openxmlformats.org/presentationml/2006/main">
   <p:cSld>
     <p:spTree>
@@ -11380,7 +11203,7 @@
 </p:sld>
 </file>
 
-<file path=ppt/slides/slide44.xml><?xml version="1.0" encoding="utf-8"?>
+<file path=ppt/slides/slide45.xml><?xml version="1.0" encoding="utf-8"?>
 <p:sld xmlns:a="http://schemas.openxmlformats.org/drawingml/2006/main" xmlns:r="http://schemas.openxmlformats.org/officeDocument/2006/relationships" xmlns:p="http://schemas.openxmlformats.org/presentationml/2006/main">
   <p:cSld>
     <p:spTree>
@@ -11490,7 +11313,7 @@
 </p:sld>
 </file>
 
-<file path=ppt/slides/slide45.xml><?xml version="1.0" encoding="utf-8"?>
+<file path=ppt/slides/slide46.xml><?xml version="1.0" encoding="utf-8"?>
 <p:sld xmlns:a="http://schemas.openxmlformats.org/drawingml/2006/main" xmlns:r="http://schemas.openxmlformats.org/officeDocument/2006/relationships" xmlns:p="http://schemas.openxmlformats.org/presentationml/2006/main">
   <p:cSld>
     <p:spTree>
@@ -12160,7 +11983,7 @@
 </p:sld>
 </file>
 
-<file path=ppt/slides/slide46.xml><?xml version="1.0" encoding="utf-8"?>
+<file path=ppt/slides/slide47.xml><?xml version="1.0" encoding="utf-8"?>
 <p:sld xmlns:a="http://schemas.openxmlformats.org/drawingml/2006/main" xmlns:r="http://schemas.openxmlformats.org/officeDocument/2006/relationships" xmlns:p="http://schemas.openxmlformats.org/presentationml/2006/main">
   <p:cSld>
     <p:spTree>
@@ -12450,130 +12273,6 @@
     <p:extLst>
       <p:ext uri="{BB962C8B-B14F-4D97-AF65-F5344CB8AC3E}">
         <p14:creationId xmlns:p14="http://schemas.microsoft.com/office/powerpoint/2010/main" val="1035140485"/>
-      </p:ext>
-    </p:extLst>
-  </p:cSld>
-  <p:clrMapOvr>
-    <a:masterClrMapping/>
-  </p:clrMapOvr>
-</p:sld>
-</file>
-
-<file path=ppt/slides/slide47.xml><?xml version="1.0" encoding="utf-8"?>
-<p:sld xmlns:a="http://schemas.openxmlformats.org/drawingml/2006/main" xmlns:r="http://schemas.openxmlformats.org/officeDocument/2006/relationships" xmlns:p="http://schemas.openxmlformats.org/presentationml/2006/main">
-  <p:cSld>
-    <p:spTree>
-      <p:nvGrpSpPr>
-        <p:cNvPr id="1" name=""/>
-        <p:cNvGrpSpPr/>
-        <p:nvPr/>
-      </p:nvGrpSpPr>
-      <p:grpSpPr>
-        <a:xfrm>
-          <a:off x="0" y="0"/>
-          <a:ext cx="0" cy="0"/>
-          <a:chOff x="0" y="0"/>
-          <a:chExt cx="0" cy="0"/>
-        </a:xfrm>
-      </p:grpSpPr>
-      <p:sp>
-        <p:nvSpPr>
-          <p:cNvPr id="2" name="Title 1"/>
-          <p:cNvSpPr>
-            <a:spLocks noGrp="1"/>
-          </p:cNvSpPr>
-          <p:nvPr>
-            <p:ph type="title"/>
-          </p:nvPr>
-        </p:nvSpPr>
-        <p:spPr>
-          <a:xfrm>
-            <a:off x="790530" y="31585"/>
-            <a:ext cx="10515600" cy="1325563"/>
-          </a:xfrm>
-        </p:spPr>
-        <p:txBody>
-          <a:bodyPr/>
-          <a:lstStyle/>
-          <a:p>
-            <a:pPr algn="ctr"/>
-            <a:r>
-              <a:rPr lang="nl-NL" dirty="0"/>
-              <a:t>Building native images – register for reflection</a:t>
-            </a:r>
-            <a:endParaRPr lang="en-US" dirty="0"/>
-          </a:p>
-        </p:txBody>
-      </p:sp>
-      <p:pic>
-        <p:nvPicPr>
-          <p:cNvPr id="3" name="Picture 2">
-            <a:extLst>
-              <a:ext uri="{FF2B5EF4-FFF2-40B4-BE49-F238E27FC236}">
-                <a16:creationId xmlns:a16="http://schemas.microsoft.com/office/drawing/2014/main" id="{A3F22D30-ECA2-48E3-9E51-ECD629421944}"/>
-              </a:ext>
-            </a:extLst>
-          </p:cNvPr>
-          <p:cNvPicPr>
-            <a:picLocks noChangeAspect="1"/>
-          </p:cNvPicPr>
-          <p:nvPr/>
-        </p:nvPicPr>
-        <p:blipFill>
-          <a:blip r:embed="rId2"/>
-          <a:stretch>
-            <a:fillRect/>
-          </a:stretch>
-        </p:blipFill>
-        <p:spPr>
-          <a:xfrm>
-            <a:off x="3048553" y="2023814"/>
-            <a:ext cx="4966516" cy="3703104"/>
-          </a:xfrm>
-          <a:prstGeom prst="rect">
-            <a:avLst/>
-          </a:prstGeom>
-        </p:spPr>
-      </p:pic>
-      <p:sp>
-        <p:nvSpPr>
-          <p:cNvPr id="5" name="TextBox 4">
-            <a:extLst>
-              <a:ext uri="{FF2B5EF4-FFF2-40B4-BE49-F238E27FC236}">
-                <a16:creationId xmlns:a16="http://schemas.microsoft.com/office/drawing/2014/main" id="{51E14A39-B46B-40CD-B70B-5C62C7FE4A7E}"/>
-              </a:ext>
-            </a:extLst>
-          </p:cNvPr>
-          <p:cNvSpPr txBox="1"/>
-          <p:nvPr/>
-        </p:nvSpPr>
-        <p:spPr>
-          <a:xfrm>
-            <a:off x="3367245" y="1136483"/>
-            <a:ext cx="4502771" cy="369332"/>
-          </a:xfrm>
-          <a:prstGeom prst="rect">
-            <a:avLst/>
-          </a:prstGeom>
-          <a:noFill/>
-        </p:spPr>
-        <p:txBody>
-          <a:bodyPr wrap="none" rtlCol="0">
-            <a:spAutoFit/>
-          </a:bodyPr>
-          <a:lstStyle/>
-          <a:p>
-            <a:r>
-              <a:rPr lang="nl-NL" dirty="0"/>
-              <a:t>GraalVM works on “closed-world” assumption</a:t>
-            </a:r>
-          </a:p>
-        </p:txBody>
-      </p:sp>
-    </p:spTree>
-    <p:extLst>
-      <p:ext uri="{BB962C8B-B14F-4D97-AF65-F5344CB8AC3E}">
-        <p14:creationId xmlns:p14="http://schemas.microsoft.com/office/powerpoint/2010/main" val="1677023441"/>
       </p:ext>
     </p:extLst>
   </p:cSld>
@@ -12629,6 +12328,130 @@
           </a:p>
         </p:txBody>
       </p:sp>
+      <p:pic>
+        <p:nvPicPr>
+          <p:cNvPr id="3" name="Picture 2">
+            <a:extLst>
+              <a:ext uri="{FF2B5EF4-FFF2-40B4-BE49-F238E27FC236}">
+                <a16:creationId xmlns:a16="http://schemas.microsoft.com/office/drawing/2014/main" id="{A3F22D30-ECA2-48E3-9E51-ECD629421944}"/>
+              </a:ext>
+            </a:extLst>
+          </p:cNvPr>
+          <p:cNvPicPr>
+            <a:picLocks noChangeAspect="1"/>
+          </p:cNvPicPr>
+          <p:nvPr/>
+        </p:nvPicPr>
+        <p:blipFill>
+          <a:blip r:embed="rId2"/>
+          <a:stretch>
+            <a:fillRect/>
+          </a:stretch>
+        </p:blipFill>
+        <p:spPr>
+          <a:xfrm>
+            <a:off x="3048553" y="2023814"/>
+            <a:ext cx="4966516" cy="3703104"/>
+          </a:xfrm>
+          <a:prstGeom prst="rect">
+            <a:avLst/>
+          </a:prstGeom>
+        </p:spPr>
+      </p:pic>
+      <p:sp>
+        <p:nvSpPr>
+          <p:cNvPr id="5" name="TextBox 4">
+            <a:extLst>
+              <a:ext uri="{FF2B5EF4-FFF2-40B4-BE49-F238E27FC236}">
+                <a16:creationId xmlns:a16="http://schemas.microsoft.com/office/drawing/2014/main" id="{51E14A39-B46B-40CD-B70B-5C62C7FE4A7E}"/>
+              </a:ext>
+            </a:extLst>
+          </p:cNvPr>
+          <p:cNvSpPr txBox="1"/>
+          <p:nvPr/>
+        </p:nvSpPr>
+        <p:spPr>
+          <a:xfrm>
+            <a:off x="3367245" y="1136483"/>
+            <a:ext cx="4502771" cy="369332"/>
+          </a:xfrm>
+          <a:prstGeom prst="rect">
+            <a:avLst/>
+          </a:prstGeom>
+          <a:noFill/>
+        </p:spPr>
+        <p:txBody>
+          <a:bodyPr wrap="none" rtlCol="0">
+            <a:spAutoFit/>
+          </a:bodyPr>
+          <a:lstStyle/>
+          <a:p>
+            <a:r>
+              <a:rPr lang="nl-NL" dirty="0"/>
+              <a:t>GraalVM works on “closed-world” assumption</a:t>
+            </a:r>
+          </a:p>
+        </p:txBody>
+      </p:sp>
+    </p:spTree>
+    <p:extLst>
+      <p:ext uri="{BB962C8B-B14F-4D97-AF65-F5344CB8AC3E}">
+        <p14:creationId xmlns:p14="http://schemas.microsoft.com/office/powerpoint/2010/main" val="1677023441"/>
+      </p:ext>
+    </p:extLst>
+  </p:cSld>
+  <p:clrMapOvr>
+    <a:masterClrMapping/>
+  </p:clrMapOvr>
+</p:sld>
+</file>
+
+<file path=ppt/slides/slide49.xml><?xml version="1.0" encoding="utf-8"?>
+<p:sld xmlns:a="http://schemas.openxmlformats.org/drawingml/2006/main" xmlns:r="http://schemas.openxmlformats.org/officeDocument/2006/relationships" xmlns:p="http://schemas.openxmlformats.org/presentationml/2006/main">
+  <p:cSld>
+    <p:spTree>
+      <p:nvGrpSpPr>
+        <p:cNvPr id="1" name=""/>
+        <p:cNvGrpSpPr/>
+        <p:nvPr/>
+      </p:nvGrpSpPr>
+      <p:grpSpPr>
+        <a:xfrm>
+          <a:off x="0" y="0"/>
+          <a:ext cx="0" cy="0"/>
+          <a:chOff x="0" y="0"/>
+          <a:chExt cx="0" cy="0"/>
+        </a:xfrm>
+      </p:grpSpPr>
+      <p:sp>
+        <p:nvSpPr>
+          <p:cNvPr id="2" name="Title 1"/>
+          <p:cNvSpPr>
+            <a:spLocks noGrp="1"/>
+          </p:cNvSpPr>
+          <p:nvPr>
+            <p:ph type="title"/>
+          </p:nvPr>
+        </p:nvSpPr>
+        <p:spPr>
+          <a:xfrm>
+            <a:off x="790530" y="31585"/>
+            <a:ext cx="10515600" cy="1325563"/>
+          </a:xfrm>
+        </p:spPr>
+        <p:txBody>
+          <a:bodyPr/>
+          <a:lstStyle/>
+          <a:p>
+            <a:pPr algn="ctr"/>
+            <a:r>
+              <a:rPr lang="nl-NL" dirty="0"/>
+              <a:t>Building native images – register for reflection</a:t>
+            </a:r>
+            <a:endParaRPr lang="en-US" dirty="0"/>
+          </a:p>
+        </p:txBody>
+      </p:sp>
       <p:sp>
         <p:nvSpPr>
           <p:cNvPr id="4" name="Rectangle 1">
@@ -13057,7 +12880,101 @@
 </p:sld>
 </file>
 
-<file path=ppt/slides/slide49.xml><?xml version="1.0" encoding="utf-8"?>
+<file path=ppt/slides/slide5.xml><?xml version="1.0" encoding="utf-8"?>
+<p:sld xmlns:a="http://schemas.openxmlformats.org/drawingml/2006/main" xmlns:r="http://schemas.openxmlformats.org/officeDocument/2006/relationships" xmlns:p="http://schemas.openxmlformats.org/presentationml/2006/main">
+  <p:cSld>
+    <p:spTree>
+      <p:nvGrpSpPr>
+        <p:cNvPr id="1" name=""/>
+        <p:cNvGrpSpPr/>
+        <p:nvPr/>
+      </p:nvGrpSpPr>
+      <p:grpSpPr>
+        <a:xfrm>
+          <a:off x="0" y="0"/>
+          <a:ext cx="0" cy="0"/>
+          <a:chOff x="0" y="0"/>
+          <a:chExt cx="0" cy="0"/>
+        </a:xfrm>
+      </p:grpSpPr>
+      <p:sp>
+        <p:nvSpPr>
+          <p:cNvPr id="2" name="Title 1">
+            <a:extLst>
+              <a:ext uri="{FF2B5EF4-FFF2-40B4-BE49-F238E27FC236}">
+                <a16:creationId xmlns:a16="http://schemas.microsoft.com/office/drawing/2014/main" id="{6E11676B-45ED-4D5C-BD55-9C59D1F4DDBA}"/>
+              </a:ext>
+            </a:extLst>
+          </p:cNvPr>
+          <p:cNvSpPr>
+            <a:spLocks noGrp="1"/>
+          </p:cNvSpPr>
+          <p:nvPr>
+            <p:ph type="title"/>
+          </p:nvPr>
+        </p:nvSpPr>
+        <p:spPr>
+          <a:xfrm>
+            <a:off x="500175" y="44435"/>
+            <a:ext cx="10515600" cy="1325563"/>
+          </a:xfrm>
+        </p:spPr>
+        <p:txBody>
+          <a:bodyPr/>
+          <a:lstStyle/>
+          <a:p>
+            <a:pPr algn="ctr"/>
+            <a:r>
+              <a:rPr lang="nl-NL" dirty="0"/>
+              <a:t>Controller</a:t>
+            </a:r>
+          </a:p>
+        </p:txBody>
+      </p:sp>
+      <p:pic>
+        <p:nvPicPr>
+          <p:cNvPr id="7" name="Picture 6">
+            <a:extLst>
+              <a:ext uri="{FF2B5EF4-FFF2-40B4-BE49-F238E27FC236}">
+                <a16:creationId xmlns:a16="http://schemas.microsoft.com/office/drawing/2014/main" id="{9456D1D8-5AD5-4149-A9AD-B17D9084A798}"/>
+              </a:ext>
+            </a:extLst>
+          </p:cNvPr>
+          <p:cNvPicPr>
+            <a:picLocks noChangeAspect="1"/>
+          </p:cNvPicPr>
+          <p:nvPr/>
+        </p:nvPicPr>
+        <p:blipFill>
+          <a:blip r:embed="rId2"/>
+          <a:stretch>
+            <a:fillRect/>
+          </a:stretch>
+        </p:blipFill>
+        <p:spPr>
+          <a:xfrm>
+            <a:off x="1581542" y="1417103"/>
+            <a:ext cx="8656286" cy="5306554"/>
+          </a:xfrm>
+          <a:prstGeom prst="rect">
+            <a:avLst/>
+          </a:prstGeom>
+        </p:spPr>
+      </p:pic>
+    </p:spTree>
+    <p:extLst>
+      <p:ext uri="{BB962C8B-B14F-4D97-AF65-F5344CB8AC3E}">
+        <p14:creationId xmlns:p14="http://schemas.microsoft.com/office/powerpoint/2010/main" val="1734600505"/>
+      </p:ext>
+    </p:extLst>
+  </p:cSld>
+  <p:clrMapOvr>
+    <a:masterClrMapping/>
+  </p:clrMapOvr>
+</p:sld>
+</file>
+
+<file path=ppt/slides/slide50.xml><?xml version="1.0" encoding="utf-8"?>
 <p:sld xmlns:a="http://schemas.openxmlformats.org/drawingml/2006/main" xmlns:r="http://schemas.openxmlformats.org/officeDocument/2006/relationships" xmlns:p="http://schemas.openxmlformats.org/presentationml/2006/main">
   <p:cSld>
     <p:spTree>
@@ -13152,100 +13069,6 @@
     <p:extLst>
       <p:ext uri="{BB962C8B-B14F-4D97-AF65-F5344CB8AC3E}">
         <p14:creationId xmlns:p14="http://schemas.microsoft.com/office/powerpoint/2010/main" val="2562391445"/>
-      </p:ext>
-    </p:extLst>
-  </p:cSld>
-  <p:clrMapOvr>
-    <a:masterClrMapping/>
-  </p:clrMapOvr>
-</p:sld>
-</file>
-
-<file path=ppt/slides/slide5.xml><?xml version="1.0" encoding="utf-8"?>
-<p:sld xmlns:a="http://schemas.openxmlformats.org/drawingml/2006/main" xmlns:r="http://schemas.openxmlformats.org/officeDocument/2006/relationships" xmlns:p="http://schemas.openxmlformats.org/presentationml/2006/main">
-  <p:cSld>
-    <p:spTree>
-      <p:nvGrpSpPr>
-        <p:cNvPr id="1" name=""/>
-        <p:cNvGrpSpPr/>
-        <p:nvPr/>
-      </p:nvGrpSpPr>
-      <p:grpSpPr>
-        <a:xfrm>
-          <a:off x="0" y="0"/>
-          <a:ext cx="0" cy="0"/>
-          <a:chOff x="0" y="0"/>
-          <a:chExt cx="0" cy="0"/>
-        </a:xfrm>
-      </p:grpSpPr>
-      <p:sp>
-        <p:nvSpPr>
-          <p:cNvPr id="2" name="Title 1">
-            <a:extLst>
-              <a:ext uri="{FF2B5EF4-FFF2-40B4-BE49-F238E27FC236}">
-                <a16:creationId xmlns:a16="http://schemas.microsoft.com/office/drawing/2014/main" id="{6E11676B-45ED-4D5C-BD55-9C59D1F4DDBA}"/>
-              </a:ext>
-            </a:extLst>
-          </p:cNvPr>
-          <p:cNvSpPr>
-            <a:spLocks noGrp="1"/>
-          </p:cNvSpPr>
-          <p:nvPr>
-            <p:ph type="title"/>
-          </p:nvPr>
-        </p:nvSpPr>
-        <p:spPr>
-          <a:xfrm>
-            <a:off x="500175" y="44435"/>
-            <a:ext cx="10515600" cy="1325563"/>
-          </a:xfrm>
-        </p:spPr>
-        <p:txBody>
-          <a:bodyPr/>
-          <a:lstStyle/>
-          <a:p>
-            <a:pPr algn="ctr"/>
-            <a:r>
-              <a:rPr lang="nl-NL" dirty="0"/>
-              <a:t>Controller</a:t>
-            </a:r>
-          </a:p>
-        </p:txBody>
-      </p:sp>
-      <p:pic>
-        <p:nvPicPr>
-          <p:cNvPr id="7" name="Picture 6">
-            <a:extLst>
-              <a:ext uri="{FF2B5EF4-FFF2-40B4-BE49-F238E27FC236}">
-                <a16:creationId xmlns:a16="http://schemas.microsoft.com/office/drawing/2014/main" id="{9456D1D8-5AD5-4149-A9AD-B17D9084A798}"/>
-              </a:ext>
-            </a:extLst>
-          </p:cNvPr>
-          <p:cNvPicPr>
-            <a:picLocks noChangeAspect="1"/>
-          </p:cNvPicPr>
-          <p:nvPr/>
-        </p:nvPicPr>
-        <p:blipFill>
-          <a:blip r:embed="rId2"/>
-          <a:stretch>
-            <a:fillRect/>
-          </a:stretch>
-        </p:blipFill>
-        <p:spPr>
-          <a:xfrm>
-            <a:off x="1581542" y="1417103"/>
-            <a:ext cx="8656286" cy="5306554"/>
-          </a:xfrm>
-          <a:prstGeom prst="rect">
-            <a:avLst/>
-          </a:prstGeom>
-        </p:spPr>
-      </p:pic>
-    </p:spTree>
-    <p:extLst>
-      <p:ext uri="{BB962C8B-B14F-4D97-AF65-F5344CB8AC3E}">
-        <p14:creationId xmlns:p14="http://schemas.microsoft.com/office/powerpoint/2010/main" val="1734600505"/>
       </p:ext>
     </p:extLst>
   </p:cSld>

</xml_diff>